<commit_message>
Sumando cambios al PCB
Se agrego al esquematico fuente de 5V con 7805 y la conexion del rfid.
</commit_message>
<xml_diff>
--- a/Diagramas.pptx
+++ b/Diagramas.pptx
@@ -244,7 +244,7 @@
           <a:p>
             <a:fld id="{D88E0641-E29E-471D-B729-DAFE3B679571}" type="datetimeFigureOut">
               <a:rPr lang="es-ES" smtClean="0"/>
-              <a:t>21/09/2018</a:t>
+              <a:t>07/10/2019</a:t>
             </a:fld>
             <a:endParaRPr lang="es-ES"/>
           </a:p>
@@ -414,7 +414,7 @@
           <a:p>
             <a:fld id="{D88E0641-E29E-471D-B729-DAFE3B679571}" type="datetimeFigureOut">
               <a:rPr lang="es-ES" smtClean="0"/>
-              <a:t>21/09/2018</a:t>
+              <a:t>07/10/2019</a:t>
             </a:fld>
             <a:endParaRPr lang="es-ES"/>
           </a:p>
@@ -594,7 +594,7 @@
           <a:p>
             <a:fld id="{D88E0641-E29E-471D-B729-DAFE3B679571}" type="datetimeFigureOut">
               <a:rPr lang="es-ES" smtClean="0"/>
-              <a:t>21/09/2018</a:t>
+              <a:t>07/10/2019</a:t>
             </a:fld>
             <a:endParaRPr lang="es-ES"/>
           </a:p>
@@ -764,7 +764,7 @@
           <a:p>
             <a:fld id="{D88E0641-E29E-471D-B729-DAFE3B679571}" type="datetimeFigureOut">
               <a:rPr lang="es-ES" smtClean="0"/>
-              <a:t>21/09/2018</a:t>
+              <a:t>07/10/2019</a:t>
             </a:fld>
             <a:endParaRPr lang="es-ES"/>
           </a:p>
@@ -1010,7 +1010,7 @@
           <a:p>
             <a:fld id="{D88E0641-E29E-471D-B729-DAFE3B679571}" type="datetimeFigureOut">
               <a:rPr lang="es-ES" smtClean="0"/>
-              <a:t>21/09/2018</a:t>
+              <a:t>07/10/2019</a:t>
             </a:fld>
             <a:endParaRPr lang="es-ES"/>
           </a:p>
@@ -1242,7 +1242,7 @@
           <a:p>
             <a:fld id="{D88E0641-E29E-471D-B729-DAFE3B679571}" type="datetimeFigureOut">
               <a:rPr lang="es-ES" smtClean="0"/>
-              <a:t>21/09/2018</a:t>
+              <a:t>07/10/2019</a:t>
             </a:fld>
             <a:endParaRPr lang="es-ES"/>
           </a:p>
@@ -1609,7 +1609,7 @@
           <a:p>
             <a:fld id="{D88E0641-E29E-471D-B729-DAFE3B679571}" type="datetimeFigureOut">
               <a:rPr lang="es-ES" smtClean="0"/>
-              <a:t>21/09/2018</a:t>
+              <a:t>07/10/2019</a:t>
             </a:fld>
             <a:endParaRPr lang="es-ES"/>
           </a:p>
@@ -1727,7 +1727,7 @@
           <a:p>
             <a:fld id="{D88E0641-E29E-471D-B729-DAFE3B679571}" type="datetimeFigureOut">
               <a:rPr lang="es-ES" smtClean="0"/>
-              <a:t>21/09/2018</a:t>
+              <a:t>07/10/2019</a:t>
             </a:fld>
             <a:endParaRPr lang="es-ES"/>
           </a:p>
@@ -1822,7 +1822,7 @@
           <a:p>
             <a:fld id="{D88E0641-E29E-471D-B729-DAFE3B679571}" type="datetimeFigureOut">
               <a:rPr lang="es-ES" smtClean="0"/>
-              <a:t>21/09/2018</a:t>
+              <a:t>07/10/2019</a:t>
             </a:fld>
             <a:endParaRPr lang="es-ES"/>
           </a:p>
@@ -2099,7 +2099,7 @@
           <a:p>
             <a:fld id="{D88E0641-E29E-471D-B729-DAFE3B679571}" type="datetimeFigureOut">
               <a:rPr lang="es-ES" smtClean="0"/>
-              <a:t>21/09/2018</a:t>
+              <a:t>07/10/2019</a:t>
             </a:fld>
             <a:endParaRPr lang="es-ES"/>
           </a:p>
@@ -2352,7 +2352,7 @@
           <a:p>
             <a:fld id="{D88E0641-E29E-471D-B729-DAFE3B679571}" type="datetimeFigureOut">
               <a:rPr lang="es-ES" smtClean="0"/>
-              <a:t>21/09/2018</a:t>
+              <a:t>07/10/2019</a:t>
             </a:fld>
             <a:endParaRPr lang="es-ES"/>
           </a:p>
@@ -2565,7 +2565,7 @@
           <a:p>
             <a:fld id="{D88E0641-E29E-471D-B729-DAFE3B679571}" type="datetimeFigureOut">
               <a:rPr lang="es-ES" smtClean="0"/>
-              <a:t>21/09/2018</a:t>
+              <a:t>07/10/2019</a:t>
             </a:fld>
             <a:endParaRPr lang="es-ES"/>
           </a:p>
@@ -2970,2411 +2970,804 @@
           <a:chExt cx="0" cy="0"/>
         </a:xfrm>
       </p:grpSpPr>
-      <p:grpSp>
-        <p:nvGrpSpPr>
-          <p:cNvPr id="11" name="Grupo 10"/>
-          <p:cNvGrpSpPr/>
+      <p:sp>
+        <p:nvSpPr>
+          <p:cNvPr id="2" name="Pentágono 1"/>
+          <p:cNvSpPr/>
           <p:nvPr/>
-        </p:nvGrpSpPr>
-        <p:grpSpPr>
-          <a:xfrm>
-            <a:off x="222060" y="584813"/>
-            <a:ext cx="2704011" cy="1110343"/>
-            <a:chOff x="4428309" y="584813"/>
-            <a:chExt cx="2704011" cy="1110343"/>
-          </a:xfrm>
-        </p:grpSpPr>
-        <p:sp>
-          <p:nvSpPr>
-            <p:cNvPr id="4" name="Rectángulo 3"/>
-            <p:cNvSpPr/>
-            <p:nvPr/>
-          </p:nvSpPr>
-          <p:spPr>
-            <a:xfrm>
-              <a:off x="4428309" y="584813"/>
-              <a:ext cx="2704011" cy="1110343"/>
-            </a:xfrm>
-            <a:prstGeom prst="rect">
-              <a:avLst/>
-            </a:prstGeom>
-            <a:solidFill>
-              <a:schemeClr val="tx1"/>
-            </a:solidFill>
-            <a:ln>
-              <a:noFill/>
-            </a:ln>
-          </p:spPr>
-          <p:style>
-            <a:lnRef idx="2">
-              <a:schemeClr val="accent1">
-                <a:shade val="50000"/>
-              </a:schemeClr>
-            </a:lnRef>
-            <a:fillRef idx="1">
-              <a:schemeClr val="accent1"/>
-            </a:fillRef>
-            <a:effectRef idx="0">
-              <a:schemeClr val="accent1"/>
-            </a:effectRef>
-            <a:fontRef idx="minor">
-              <a:schemeClr val="lt1"/>
-            </a:fontRef>
-          </p:style>
-          <p:txBody>
-            <a:bodyPr rtlCol="0" anchor="ctr"/>
-            <a:lstStyle/>
-            <a:p>
-              <a:pPr algn="ctr"/>
-              <a:endParaRPr lang="es-ES"/>
-            </a:p>
-          </p:txBody>
-        </p:sp>
-        <p:grpSp>
-          <p:nvGrpSpPr>
-            <p:cNvPr id="10" name="Grupo 9"/>
-            <p:cNvGrpSpPr/>
-            <p:nvPr/>
-          </p:nvGrpSpPr>
-          <p:grpSpPr>
-            <a:xfrm>
-              <a:off x="4543863" y="826308"/>
-              <a:ext cx="2469890" cy="636732"/>
-              <a:chOff x="4543863" y="826308"/>
-              <a:chExt cx="2469890" cy="636732"/>
-            </a:xfrm>
-            <a:solidFill>
-              <a:schemeClr val="bg2">
-                <a:lumMod val="75000"/>
-              </a:schemeClr>
-            </a:solidFill>
-          </p:grpSpPr>
-          <p:sp>
-            <p:nvSpPr>
-              <p:cNvPr id="5" name="Rectángulo 4"/>
-              <p:cNvSpPr/>
-              <p:nvPr/>
-            </p:nvSpPr>
-            <p:spPr>
-              <a:xfrm>
-                <a:off x="4543863" y="836023"/>
-                <a:ext cx="470263" cy="627017"/>
-              </a:xfrm>
-              <a:prstGeom prst="rect">
-                <a:avLst/>
-              </a:prstGeom>
-              <a:grpFill/>
-              <a:ln>
-                <a:noFill/>
-              </a:ln>
-            </p:spPr>
-            <p:style>
-              <a:lnRef idx="2">
-                <a:schemeClr val="accent1">
-                  <a:shade val="50000"/>
-                </a:schemeClr>
-              </a:lnRef>
-              <a:fillRef idx="1">
-                <a:schemeClr val="accent1"/>
-              </a:fillRef>
-              <a:effectRef idx="0">
-                <a:schemeClr val="accent1"/>
-              </a:effectRef>
-              <a:fontRef idx="minor">
-                <a:schemeClr val="lt1"/>
-              </a:fontRef>
-            </p:style>
-            <p:txBody>
-              <a:bodyPr rtlCol="0" anchor="ctr"/>
-              <a:lstStyle/>
-              <a:p>
-                <a:pPr algn="ctr"/>
-                <a:r>
-                  <a:rPr lang="es-ES" sz="4000" b="1" dirty="0">
-                    <a:solidFill>
-                      <a:srgbClr val="FF0000"/>
-                    </a:solidFill>
-                    <a:latin typeface="Century Gothic" panose="020B0502020202020204" pitchFamily="34" charset="0"/>
-                  </a:rPr>
-                  <a:t>0</a:t>
-                </a:r>
-              </a:p>
-            </p:txBody>
-          </p:sp>
-          <p:sp>
-            <p:nvSpPr>
-              <p:cNvPr id="6" name="Rectángulo 5"/>
-              <p:cNvSpPr/>
-              <p:nvPr/>
-            </p:nvSpPr>
-            <p:spPr>
-              <a:xfrm>
-                <a:off x="5035898" y="831668"/>
-                <a:ext cx="470263" cy="627017"/>
-              </a:xfrm>
-              <a:prstGeom prst="rect">
-                <a:avLst/>
-              </a:prstGeom>
-              <a:grpFill/>
-              <a:ln>
-                <a:noFill/>
-              </a:ln>
-            </p:spPr>
-            <p:style>
-              <a:lnRef idx="2">
-                <a:schemeClr val="accent1">
-                  <a:shade val="50000"/>
-                </a:schemeClr>
-              </a:lnRef>
-              <a:fillRef idx="1">
-                <a:schemeClr val="accent1"/>
-              </a:fillRef>
-              <a:effectRef idx="0">
-                <a:schemeClr val="accent1"/>
-              </a:effectRef>
-              <a:fontRef idx="minor">
-                <a:schemeClr val="lt1"/>
-              </a:fontRef>
-            </p:style>
-            <p:txBody>
-              <a:bodyPr rtlCol="0" anchor="ctr"/>
-              <a:lstStyle/>
-              <a:p>
-                <a:pPr algn="ctr"/>
-                <a:r>
-                  <a:rPr lang="es-ES" sz="4000" b="1" dirty="0" smtClean="0">
-                    <a:solidFill>
-                      <a:srgbClr val="FF0000"/>
-                    </a:solidFill>
-                    <a:latin typeface="Century Gothic" panose="020B0502020202020204" pitchFamily="34" charset="0"/>
-                  </a:rPr>
-                  <a:t>0</a:t>
-                </a:r>
-                <a:endParaRPr lang="es-ES" sz="4000" b="1" dirty="0">
-                  <a:solidFill>
-                    <a:srgbClr val="FF0000"/>
-                  </a:solidFill>
-                  <a:latin typeface="Century Gothic" panose="020B0502020202020204" pitchFamily="34" charset="0"/>
-                </a:endParaRPr>
-              </a:p>
-            </p:txBody>
-          </p:sp>
-          <p:sp>
-            <p:nvSpPr>
-              <p:cNvPr id="7" name="Rectángulo 6"/>
-              <p:cNvSpPr/>
-              <p:nvPr/>
-            </p:nvSpPr>
-            <p:spPr>
-              <a:xfrm>
-                <a:off x="5532288" y="831668"/>
-                <a:ext cx="470263" cy="627017"/>
-              </a:xfrm>
-              <a:prstGeom prst="rect">
-                <a:avLst/>
-              </a:prstGeom>
-              <a:grpFill/>
-              <a:ln>
-                <a:noFill/>
-              </a:ln>
-            </p:spPr>
-            <p:style>
-              <a:lnRef idx="2">
-                <a:schemeClr val="accent1">
-                  <a:shade val="50000"/>
-                </a:schemeClr>
-              </a:lnRef>
-              <a:fillRef idx="1">
-                <a:schemeClr val="accent1"/>
-              </a:fillRef>
-              <a:effectRef idx="0">
-                <a:schemeClr val="accent1"/>
-              </a:effectRef>
-              <a:fontRef idx="minor">
-                <a:schemeClr val="lt1"/>
-              </a:fontRef>
-            </p:style>
-            <p:txBody>
-              <a:bodyPr rtlCol="0" anchor="ctr"/>
-              <a:lstStyle/>
-              <a:p>
-                <a:pPr algn="ctr"/>
-                <a:r>
-                  <a:rPr lang="es-ES" sz="4000" b="1" dirty="0" smtClean="0">
-                    <a:solidFill>
-                      <a:srgbClr val="FF0000"/>
-                    </a:solidFill>
-                    <a:latin typeface="Century Gothic" panose="020B0502020202020204" pitchFamily="34" charset="0"/>
-                  </a:rPr>
-                  <a:t>0</a:t>
-                </a:r>
-                <a:endParaRPr lang="es-ES" sz="4000" b="1" dirty="0">
-                  <a:solidFill>
-                    <a:srgbClr val="FF0000"/>
-                  </a:solidFill>
-                  <a:latin typeface="Century Gothic" panose="020B0502020202020204" pitchFamily="34" charset="0"/>
-                </a:endParaRPr>
-              </a:p>
-            </p:txBody>
-          </p:sp>
-          <p:sp>
-            <p:nvSpPr>
-              <p:cNvPr id="8" name="Rectángulo 7"/>
-              <p:cNvSpPr/>
-              <p:nvPr/>
-            </p:nvSpPr>
-            <p:spPr>
-              <a:xfrm>
-                <a:off x="6037386" y="826308"/>
-                <a:ext cx="470263" cy="632377"/>
-              </a:xfrm>
-              <a:prstGeom prst="rect">
-                <a:avLst/>
-              </a:prstGeom>
-              <a:grpFill/>
-              <a:ln>
-                <a:noFill/>
-              </a:ln>
-            </p:spPr>
-            <p:style>
-              <a:lnRef idx="2">
-                <a:schemeClr val="accent1">
-                  <a:shade val="50000"/>
-                </a:schemeClr>
-              </a:lnRef>
-              <a:fillRef idx="1">
-                <a:schemeClr val="accent1"/>
-              </a:fillRef>
-              <a:effectRef idx="0">
-                <a:schemeClr val="accent1"/>
-              </a:effectRef>
-              <a:fontRef idx="minor">
-                <a:schemeClr val="lt1"/>
-              </a:fontRef>
-            </p:style>
-            <p:txBody>
-              <a:bodyPr rtlCol="0" anchor="ctr"/>
-              <a:lstStyle/>
-              <a:p>
-                <a:pPr algn="ctr"/>
-                <a:r>
-                  <a:rPr lang="es-ES" sz="4000" b="1" dirty="0" smtClean="0">
-                    <a:solidFill>
-                      <a:srgbClr val="FF0000"/>
-                    </a:solidFill>
-                    <a:latin typeface="Century Gothic" panose="020B0502020202020204" pitchFamily="34" charset="0"/>
-                  </a:rPr>
-                  <a:t>0</a:t>
-                </a:r>
-                <a:endParaRPr lang="es-ES" sz="4000" b="1" dirty="0">
-                  <a:solidFill>
-                    <a:srgbClr val="FF0000"/>
-                  </a:solidFill>
-                  <a:latin typeface="Century Gothic" panose="020B0502020202020204" pitchFamily="34" charset="0"/>
-                </a:endParaRPr>
-              </a:p>
-            </p:txBody>
-          </p:sp>
-          <p:sp>
-            <p:nvSpPr>
-              <p:cNvPr id="9" name="Rectángulo 8"/>
-              <p:cNvSpPr/>
-              <p:nvPr/>
-            </p:nvSpPr>
-            <p:spPr>
-              <a:xfrm>
-                <a:off x="6543490" y="836021"/>
-                <a:ext cx="470263" cy="627017"/>
-              </a:xfrm>
-              <a:prstGeom prst="rect">
-                <a:avLst/>
-              </a:prstGeom>
-              <a:grpFill/>
-              <a:ln>
-                <a:noFill/>
-              </a:ln>
-            </p:spPr>
-            <p:style>
-              <a:lnRef idx="2">
-                <a:schemeClr val="accent1">
-                  <a:shade val="50000"/>
-                </a:schemeClr>
-              </a:lnRef>
-              <a:fillRef idx="1">
-                <a:schemeClr val="accent1"/>
-              </a:fillRef>
-              <a:effectRef idx="0">
-                <a:schemeClr val="accent1"/>
-              </a:effectRef>
-              <a:fontRef idx="minor">
-                <a:schemeClr val="lt1"/>
-              </a:fontRef>
-            </p:style>
-            <p:txBody>
-              <a:bodyPr rtlCol="0" anchor="ctr"/>
-              <a:lstStyle/>
-              <a:p>
-                <a:pPr algn="ctr"/>
-                <a:r>
-                  <a:rPr lang="es-ES" sz="4000" b="1" dirty="0" smtClean="0">
-                    <a:solidFill>
-                      <a:srgbClr val="FF0000"/>
-                    </a:solidFill>
-                    <a:latin typeface="Century Gothic" panose="020B0502020202020204" pitchFamily="34" charset="0"/>
-                  </a:rPr>
-                  <a:t>0</a:t>
-                </a:r>
-                <a:endParaRPr lang="es-ES" sz="4000" b="1" dirty="0">
-                  <a:solidFill>
-                    <a:srgbClr val="FF0000"/>
-                  </a:solidFill>
-                  <a:latin typeface="Century Gothic" panose="020B0502020202020204" pitchFamily="34" charset="0"/>
-                </a:endParaRPr>
-              </a:p>
-            </p:txBody>
-          </p:sp>
-        </p:grpSp>
-      </p:grpSp>
-      <p:grpSp>
-        <p:nvGrpSpPr>
-          <p:cNvPr id="12" name="Grupo 11"/>
-          <p:cNvGrpSpPr/>
-          <p:nvPr/>
-        </p:nvGrpSpPr>
-        <p:grpSpPr>
-          <a:xfrm>
-            <a:off x="222059" y="1697499"/>
-            <a:ext cx="2704011" cy="1110343"/>
-            <a:chOff x="4428309" y="584813"/>
-            <a:chExt cx="2704011" cy="1110343"/>
-          </a:xfrm>
-        </p:grpSpPr>
-        <p:sp>
-          <p:nvSpPr>
-            <p:cNvPr id="13" name="Rectángulo 12"/>
-            <p:cNvSpPr/>
-            <p:nvPr/>
-          </p:nvSpPr>
-          <p:spPr>
-            <a:xfrm>
-              <a:off x="4428309" y="584813"/>
-              <a:ext cx="2704011" cy="1110343"/>
-            </a:xfrm>
-            <a:prstGeom prst="rect">
-              <a:avLst/>
-            </a:prstGeom>
-            <a:solidFill>
-              <a:schemeClr val="tx1"/>
-            </a:solidFill>
-            <a:ln>
-              <a:noFill/>
-            </a:ln>
-          </p:spPr>
-          <p:style>
-            <a:lnRef idx="2">
-              <a:schemeClr val="accent1">
-                <a:shade val="50000"/>
-              </a:schemeClr>
-            </a:lnRef>
-            <a:fillRef idx="1">
-              <a:schemeClr val="accent1"/>
-            </a:fillRef>
-            <a:effectRef idx="0">
-              <a:schemeClr val="accent1"/>
-            </a:effectRef>
-            <a:fontRef idx="minor">
-              <a:schemeClr val="lt1"/>
-            </a:fontRef>
-          </p:style>
-          <p:txBody>
-            <a:bodyPr rtlCol="0" anchor="ctr"/>
-            <a:lstStyle/>
-            <a:p>
-              <a:pPr algn="ctr"/>
-              <a:endParaRPr lang="es-ES"/>
-            </a:p>
-          </p:txBody>
-        </p:sp>
-        <p:grpSp>
-          <p:nvGrpSpPr>
-            <p:cNvPr id="14" name="Grupo 13"/>
-            <p:cNvGrpSpPr/>
-            <p:nvPr/>
-          </p:nvGrpSpPr>
-          <p:grpSpPr>
-            <a:xfrm>
-              <a:off x="4543863" y="826308"/>
-              <a:ext cx="2469890" cy="636732"/>
-              <a:chOff x="4543863" y="826308"/>
-              <a:chExt cx="2469890" cy="636732"/>
-            </a:xfrm>
-            <a:solidFill>
-              <a:schemeClr val="bg2">
-                <a:lumMod val="75000"/>
-              </a:schemeClr>
-            </a:solidFill>
-          </p:grpSpPr>
-          <p:sp>
-            <p:nvSpPr>
-              <p:cNvPr id="15" name="Rectángulo 14"/>
-              <p:cNvSpPr/>
-              <p:nvPr/>
-            </p:nvSpPr>
-            <p:spPr>
-              <a:xfrm>
-                <a:off x="4543863" y="836023"/>
-                <a:ext cx="470263" cy="627017"/>
-              </a:xfrm>
-              <a:prstGeom prst="rect">
-                <a:avLst/>
-              </a:prstGeom>
-              <a:grpFill/>
-              <a:ln>
-                <a:noFill/>
-              </a:ln>
-            </p:spPr>
-            <p:style>
-              <a:lnRef idx="2">
-                <a:schemeClr val="accent1">
-                  <a:shade val="50000"/>
-                </a:schemeClr>
-              </a:lnRef>
-              <a:fillRef idx="1">
-                <a:schemeClr val="accent1"/>
-              </a:fillRef>
-              <a:effectRef idx="0">
-                <a:schemeClr val="accent1"/>
-              </a:effectRef>
-              <a:fontRef idx="minor">
-                <a:schemeClr val="lt1"/>
-              </a:fontRef>
-            </p:style>
-            <p:txBody>
-              <a:bodyPr rtlCol="0" anchor="ctr"/>
-              <a:lstStyle/>
-              <a:p>
-                <a:pPr algn="ctr"/>
-                <a:r>
-                  <a:rPr lang="es-ES" sz="4000" b="1" dirty="0" smtClean="0">
-                    <a:solidFill>
-                      <a:srgbClr val="FF0000"/>
-                    </a:solidFill>
-                    <a:latin typeface="Century Gothic" panose="020B0502020202020204" pitchFamily="34" charset="0"/>
-                  </a:rPr>
-                  <a:t>9</a:t>
-                </a:r>
-                <a:endParaRPr lang="es-ES" sz="4000" b="1" dirty="0">
-                  <a:solidFill>
-                    <a:srgbClr val="FF0000"/>
-                  </a:solidFill>
-                  <a:latin typeface="Century Gothic" panose="020B0502020202020204" pitchFamily="34" charset="0"/>
-                </a:endParaRPr>
-              </a:p>
-            </p:txBody>
-          </p:sp>
-          <p:sp>
-            <p:nvSpPr>
-              <p:cNvPr id="16" name="Rectángulo 15"/>
-              <p:cNvSpPr/>
-              <p:nvPr/>
-            </p:nvSpPr>
-            <p:spPr>
-              <a:xfrm>
-                <a:off x="5035898" y="831668"/>
-                <a:ext cx="470263" cy="627017"/>
-              </a:xfrm>
-              <a:prstGeom prst="rect">
-                <a:avLst/>
-              </a:prstGeom>
-              <a:grpFill/>
-              <a:ln>
-                <a:noFill/>
-              </a:ln>
-            </p:spPr>
-            <p:style>
-              <a:lnRef idx="2">
-                <a:schemeClr val="accent1">
-                  <a:shade val="50000"/>
-                </a:schemeClr>
-              </a:lnRef>
-              <a:fillRef idx="1">
-                <a:schemeClr val="accent1"/>
-              </a:fillRef>
-              <a:effectRef idx="0">
-                <a:schemeClr val="accent1"/>
-              </a:effectRef>
-              <a:fontRef idx="minor">
-                <a:schemeClr val="lt1"/>
-              </a:fontRef>
-            </p:style>
-            <p:txBody>
-              <a:bodyPr rtlCol="0" anchor="ctr"/>
-              <a:lstStyle/>
-              <a:p>
-                <a:pPr algn="ctr"/>
-                <a:r>
-                  <a:rPr lang="es-ES" sz="4000" b="1" dirty="0">
-                    <a:solidFill>
-                      <a:srgbClr val="FF0000"/>
-                    </a:solidFill>
-                    <a:latin typeface="Century Gothic" panose="020B0502020202020204" pitchFamily="34" charset="0"/>
-                  </a:rPr>
-                  <a:t>9</a:t>
-                </a:r>
-              </a:p>
-            </p:txBody>
-          </p:sp>
-          <p:sp>
-            <p:nvSpPr>
-              <p:cNvPr id="17" name="Rectángulo 16"/>
-              <p:cNvSpPr/>
-              <p:nvPr/>
-            </p:nvSpPr>
-            <p:spPr>
-              <a:xfrm>
-                <a:off x="5532288" y="831668"/>
-                <a:ext cx="470263" cy="627017"/>
-              </a:xfrm>
-              <a:prstGeom prst="rect">
-                <a:avLst/>
-              </a:prstGeom>
-              <a:grpFill/>
-              <a:ln>
-                <a:noFill/>
-              </a:ln>
-            </p:spPr>
-            <p:style>
-              <a:lnRef idx="2">
-                <a:schemeClr val="accent1">
-                  <a:shade val="50000"/>
-                </a:schemeClr>
-              </a:lnRef>
-              <a:fillRef idx="1">
-                <a:schemeClr val="accent1"/>
-              </a:fillRef>
-              <a:effectRef idx="0">
-                <a:schemeClr val="accent1"/>
-              </a:effectRef>
-              <a:fontRef idx="minor">
-                <a:schemeClr val="lt1"/>
-              </a:fontRef>
-            </p:style>
-            <p:txBody>
-              <a:bodyPr rtlCol="0" anchor="ctr"/>
-              <a:lstStyle/>
-              <a:p>
-                <a:pPr algn="ctr"/>
-                <a:r>
-                  <a:rPr lang="es-ES" sz="4000" b="1" dirty="0">
-                    <a:solidFill>
-                      <a:srgbClr val="FF0000"/>
-                    </a:solidFill>
-                    <a:latin typeface="Century Gothic" panose="020B0502020202020204" pitchFamily="34" charset="0"/>
-                  </a:rPr>
-                  <a:t>9</a:t>
-                </a:r>
-              </a:p>
-            </p:txBody>
-          </p:sp>
-          <p:sp>
-            <p:nvSpPr>
-              <p:cNvPr id="18" name="Rectángulo 17"/>
-              <p:cNvSpPr/>
-              <p:nvPr/>
-            </p:nvSpPr>
-            <p:spPr>
-              <a:xfrm>
-                <a:off x="6037386" y="826308"/>
-                <a:ext cx="470263" cy="632377"/>
-              </a:xfrm>
-              <a:prstGeom prst="rect">
-                <a:avLst/>
-              </a:prstGeom>
-              <a:grpFill/>
-              <a:ln>
-                <a:noFill/>
-              </a:ln>
-            </p:spPr>
-            <p:style>
-              <a:lnRef idx="2">
-                <a:schemeClr val="accent1">
-                  <a:shade val="50000"/>
-                </a:schemeClr>
-              </a:lnRef>
-              <a:fillRef idx="1">
-                <a:schemeClr val="accent1"/>
-              </a:fillRef>
-              <a:effectRef idx="0">
-                <a:schemeClr val="accent1"/>
-              </a:effectRef>
-              <a:fontRef idx="minor">
-                <a:schemeClr val="lt1"/>
-              </a:fontRef>
-            </p:style>
-            <p:txBody>
-              <a:bodyPr rtlCol="0" anchor="ctr"/>
-              <a:lstStyle/>
-              <a:p>
-                <a:pPr algn="ctr"/>
-                <a:r>
-                  <a:rPr lang="es-ES" sz="4000" b="1" dirty="0">
-                    <a:solidFill>
-                      <a:srgbClr val="FF0000"/>
-                    </a:solidFill>
-                    <a:latin typeface="Century Gothic" panose="020B0502020202020204" pitchFamily="34" charset="0"/>
-                  </a:rPr>
-                  <a:t>9</a:t>
-                </a:r>
-              </a:p>
-            </p:txBody>
-          </p:sp>
-          <p:sp>
-            <p:nvSpPr>
-              <p:cNvPr id="19" name="Rectángulo 18"/>
-              <p:cNvSpPr/>
-              <p:nvPr/>
-            </p:nvSpPr>
-            <p:spPr>
-              <a:xfrm>
-                <a:off x="6543490" y="836021"/>
-                <a:ext cx="470263" cy="627017"/>
-              </a:xfrm>
-              <a:prstGeom prst="rect">
-                <a:avLst/>
-              </a:prstGeom>
-              <a:grpFill/>
-              <a:ln>
-                <a:noFill/>
-              </a:ln>
-            </p:spPr>
-            <p:style>
-              <a:lnRef idx="2">
-                <a:schemeClr val="accent1">
-                  <a:shade val="50000"/>
-                </a:schemeClr>
-              </a:lnRef>
-              <a:fillRef idx="1">
-                <a:schemeClr val="accent1"/>
-              </a:fillRef>
-              <a:effectRef idx="0">
-                <a:schemeClr val="accent1"/>
-              </a:effectRef>
-              <a:fontRef idx="minor">
-                <a:schemeClr val="lt1"/>
-              </a:fontRef>
-            </p:style>
-            <p:txBody>
-              <a:bodyPr rtlCol="0" anchor="ctr"/>
-              <a:lstStyle/>
-              <a:p>
-                <a:pPr algn="ctr"/>
-                <a:r>
-                  <a:rPr lang="es-ES" sz="4000" b="1" dirty="0">
-                    <a:solidFill>
-                      <a:srgbClr val="FF0000"/>
-                    </a:solidFill>
-                    <a:latin typeface="Century Gothic" panose="020B0502020202020204" pitchFamily="34" charset="0"/>
-                  </a:rPr>
-                  <a:t>9</a:t>
-                </a:r>
-              </a:p>
-            </p:txBody>
-          </p:sp>
-        </p:grpSp>
-      </p:grpSp>
-      <p:grpSp>
-        <p:nvGrpSpPr>
-          <p:cNvPr id="20" name="Grupo 19"/>
-          <p:cNvGrpSpPr/>
-          <p:nvPr/>
-        </p:nvGrpSpPr>
-        <p:grpSpPr>
-          <a:xfrm>
-            <a:off x="230435" y="5064366"/>
-            <a:ext cx="2704011" cy="1110343"/>
-            <a:chOff x="4428309" y="584813"/>
-            <a:chExt cx="2704011" cy="1110343"/>
-          </a:xfrm>
-        </p:grpSpPr>
-        <p:sp>
-          <p:nvSpPr>
-            <p:cNvPr id="21" name="Rectángulo 20"/>
-            <p:cNvSpPr/>
-            <p:nvPr/>
-          </p:nvSpPr>
-          <p:spPr>
-            <a:xfrm>
-              <a:off x="4428309" y="584813"/>
-              <a:ext cx="2704011" cy="1110343"/>
-            </a:xfrm>
-            <a:prstGeom prst="rect">
-              <a:avLst/>
-            </a:prstGeom>
-            <a:solidFill>
-              <a:schemeClr val="tx1"/>
-            </a:solidFill>
-            <a:ln>
-              <a:noFill/>
-            </a:ln>
-          </p:spPr>
-          <p:style>
-            <a:lnRef idx="2">
-              <a:schemeClr val="accent1">
-                <a:shade val="50000"/>
-              </a:schemeClr>
-            </a:lnRef>
-            <a:fillRef idx="1">
-              <a:schemeClr val="accent1"/>
-            </a:fillRef>
-            <a:effectRef idx="0">
-              <a:schemeClr val="accent1"/>
-            </a:effectRef>
-            <a:fontRef idx="minor">
-              <a:schemeClr val="lt1"/>
-            </a:fontRef>
-          </p:style>
-          <p:txBody>
-            <a:bodyPr rtlCol="0" anchor="ctr"/>
-            <a:lstStyle/>
-            <a:p>
-              <a:pPr algn="ctr"/>
-              <a:endParaRPr lang="es-ES">
-                <a:effectLst>
-                  <a:glow>
-                    <a:schemeClr val="accent1">
-                      <a:alpha val="41000"/>
-                    </a:schemeClr>
-                  </a:glow>
-                </a:effectLst>
-              </a:endParaRPr>
-            </a:p>
-          </p:txBody>
-        </p:sp>
-        <p:grpSp>
-          <p:nvGrpSpPr>
-            <p:cNvPr id="22" name="Grupo 21"/>
-            <p:cNvGrpSpPr/>
-            <p:nvPr/>
-          </p:nvGrpSpPr>
-          <p:grpSpPr>
-            <a:xfrm>
-              <a:off x="4543863" y="826308"/>
-              <a:ext cx="2469890" cy="636732"/>
-              <a:chOff x="4543863" y="826308"/>
-              <a:chExt cx="2469890" cy="636732"/>
-            </a:xfrm>
-            <a:solidFill>
-              <a:schemeClr val="bg2">
-                <a:lumMod val="75000"/>
-              </a:schemeClr>
-            </a:solidFill>
-          </p:grpSpPr>
-          <p:sp>
-            <p:nvSpPr>
-              <p:cNvPr id="23" name="Rectángulo 22"/>
-              <p:cNvSpPr/>
-              <p:nvPr/>
-            </p:nvSpPr>
-            <p:spPr>
-              <a:xfrm>
-                <a:off x="4543863" y="836023"/>
-                <a:ext cx="470263" cy="627017"/>
-              </a:xfrm>
-              <a:prstGeom prst="rect">
-                <a:avLst/>
-              </a:prstGeom>
-              <a:grpFill/>
-              <a:ln>
-                <a:noFill/>
-              </a:ln>
-            </p:spPr>
-            <p:style>
-              <a:lnRef idx="2">
-                <a:schemeClr val="accent1">
-                  <a:shade val="50000"/>
-                </a:schemeClr>
-              </a:lnRef>
-              <a:fillRef idx="1">
-                <a:schemeClr val="accent1"/>
-              </a:fillRef>
-              <a:effectRef idx="0">
-                <a:schemeClr val="accent1"/>
-              </a:effectRef>
-              <a:fontRef idx="minor">
-                <a:schemeClr val="lt1"/>
-              </a:fontRef>
-            </p:style>
-            <p:txBody>
-              <a:bodyPr rtlCol="0" anchor="ctr"/>
-              <a:lstStyle/>
-              <a:p>
-                <a:pPr algn="ctr"/>
-                <a:r>
-                  <a:rPr lang="es-ES" sz="4000" b="1" dirty="0" smtClean="0">
-                    <a:solidFill>
-                      <a:srgbClr val="FF0000"/>
-                    </a:solidFill>
-                    <a:latin typeface="Century Gothic" panose="020B0502020202020204" pitchFamily="34" charset="0"/>
-                  </a:rPr>
-                  <a:t>Y</a:t>
-                </a:r>
-                <a:endParaRPr lang="es-ES" sz="4000" b="1" dirty="0">
-                  <a:solidFill>
-                    <a:srgbClr val="FF0000"/>
-                  </a:solidFill>
-                  <a:latin typeface="Century Gothic" panose="020B0502020202020204" pitchFamily="34" charset="0"/>
-                </a:endParaRPr>
-              </a:p>
-            </p:txBody>
-          </p:sp>
-          <p:sp>
-            <p:nvSpPr>
-              <p:cNvPr id="24" name="Rectángulo 23"/>
-              <p:cNvSpPr/>
-              <p:nvPr/>
-            </p:nvSpPr>
-            <p:spPr>
-              <a:xfrm>
-                <a:off x="5035898" y="831668"/>
-                <a:ext cx="470263" cy="627017"/>
-              </a:xfrm>
-              <a:prstGeom prst="rect">
-                <a:avLst/>
-              </a:prstGeom>
-              <a:grpFill/>
-              <a:ln>
-                <a:noFill/>
-              </a:ln>
-            </p:spPr>
-            <p:style>
-              <a:lnRef idx="2">
-                <a:schemeClr val="accent1">
-                  <a:shade val="50000"/>
-                </a:schemeClr>
-              </a:lnRef>
-              <a:fillRef idx="1">
-                <a:schemeClr val="accent1"/>
-              </a:fillRef>
-              <a:effectRef idx="0">
-                <a:schemeClr val="accent1"/>
-              </a:effectRef>
-              <a:fontRef idx="minor">
-                <a:schemeClr val="lt1"/>
-              </a:fontRef>
-            </p:style>
-            <p:txBody>
-              <a:bodyPr rtlCol="0" anchor="ctr"/>
-              <a:lstStyle/>
-              <a:p>
-                <a:pPr algn="ctr"/>
-                <a:r>
-                  <a:rPr lang="es-ES" sz="4000" b="1" dirty="0">
-                    <a:solidFill>
-                      <a:srgbClr val="FF0000"/>
-                    </a:solidFill>
-                    <a:latin typeface="Century Gothic" panose="020B0502020202020204" pitchFamily="34" charset="0"/>
-                  </a:rPr>
-                  <a:t>Y</a:t>
-                </a:r>
-              </a:p>
-            </p:txBody>
-          </p:sp>
-          <p:sp>
-            <p:nvSpPr>
-              <p:cNvPr id="25" name="Rectángulo 24"/>
-              <p:cNvSpPr/>
-              <p:nvPr/>
-            </p:nvSpPr>
-            <p:spPr>
-              <a:xfrm>
-                <a:off x="5532288" y="831668"/>
-                <a:ext cx="470263" cy="627017"/>
-              </a:xfrm>
-              <a:prstGeom prst="rect">
-                <a:avLst/>
-              </a:prstGeom>
-              <a:grpFill/>
-              <a:ln>
-                <a:noFill/>
-              </a:ln>
-            </p:spPr>
-            <p:style>
-              <a:lnRef idx="2">
-                <a:schemeClr val="accent1">
-                  <a:shade val="50000"/>
-                </a:schemeClr>
-              </a:lnRef>
-              <a:fillRef idx="1">
-                <a:schemeClr val="accent1"/>
-              </a:fillRef>
-              <a:effectRef idx="0">
-                <a:schemeClr val="accent1"/>
-              </a:effectRef>
-              <a:fontRef idx="minor">
-                <a:schemeClr val="lt1"/>
-              </a:fontRef>
-            </p:style>
-            <p:txBody>
-              <a:bodyPr rtlCol="0" anchor="ctr"/>
-              <a:lstStyle/>
-              <a:p>
-                <a:pPr algn="ctr"/>
-                <a:r>
-                  <a:rPr lang="es-ES" sz="4000" b="1" dirty="0" smtClean="0">
-                    <a:solidFill>
-                      <a:srgbClr val="FF0000"/>
-                    </a:solidFill>
-                    <a:latin typeface="Century Gothic" panose="020B0502020202020204" pitchFamily="34" charset="0"/>
-                  </a:rPr>
-                  <a:t>Y</a:t>
-                </a:r>
-                <a:endParaRPr lang="es-ES" sz="4000" b="1" dirty="0">
-                  <a:solidFill>
-                    <a:srgbClr val="FF0000"/>
-                  </a:solidFill>
-                  <a:latin typeface="Century Gothic" panose="020B0502020202020204" pitchFamily="34" charset="0"/>
-                </a:endParaRPr>
-              </a:p>
-            </p:txBody>
-          </p:sp>
-          <p:sp>
-            <p:nvSpPr>
-              <p:cNvPr id="26" name="Rectángulo 25"/>
-              <p:cNvSpPr/>
-              <p:nvPr/>
-            </p:nvSpPr>
-            <p:spPr>
-              <a:xfrm>
-                <a:off x="6037386" y="826308"/>
-                <a:ext cx="470263" cy="632377"/>
-              </a:xfrm>
-              <a:prstGeom prst="rect">
-                <a:avLst/>
-              </a:prstGeom>
-              <a:grpFill/>
-              <a:ln>
-                <a:noFill/>
-              </a:ln>
-            </p:spPr>
-            <p:style>
-              <a:lnRef idx="2">
-                <a:schemeClr val="accent1">
-                  <a:shade val="50000"/>
-                </a:schemeClr>
-              </a:lnRef>
-              <a:fillRef idx="1">
-                <a:schemeClr val="accent1"/>
-              </a:fillRef>
-              <a:effectRef idx="0">
-                <a:schemeClr val="accent1"/>
-              </a:effectRef>
-              <a:fontRef idx="minor">
-                <a:schemeClr val="lt1"/>
-              </a:fontRef>
-            </p:style>
-            <p:txBody>
-              <a:bodyPr rtlCol="0" anchor="ctr"/>
-              <a:lstStyle/>
-              <a:p>
-                <a:pPr algn="ctr"/>
-                <a:r>
-                  <a:rPr lang="es-ES" sz="4000" b="1" dirty="0" smtClean="0">
-                    <a:solidFill>
-                      <a:srgbClr val="FF0000"/>
-                    </a:solidFill>
-                    <a:latin typeface="Century Gothic" panose="020B0502020202020204" pitchFamily="34" charset="0"/>
-                  </a:rPr>
-                  <a:t>Y</a:t>
-                </a:r>
-                <a:endParaRPr lang="es-ES" sz="4000" b="1" dirty="0">
-                  <a:solidFill>
-                    <a:srgbClr val="FF0000"/>
-                  </a:solidFill>
-                  <a:latin typeface="Century Gothic" panose="020B0502020202020204" pitchFamily="34" charset="0"/>
-                </a:endParaRPr>
-              </a:p>
-            </p:txBody>
-          </p:sp>
-          <p:sp>
-            <p:nvSpPr>
-              <p:cNvPr id="27" name="Rectángulo 26"/>
-              <p:cNvSpPr/>
-              <p:nvPr/>
-            </p:nvSpPr>
-            <p:spPr>
-              <a:xfrm>
-                <a:off x="6543490" y="836021"/>
-                <a:ext cx="470263" cy="627017"/>
-              </a:xfrm>
-              <a:prstGeom prst="rect">
-                <a:avLst/>
-              </a:prstGeom>
-              <a:grpFill/>
-              <a:ln>
-                <a:noFill/>
-              </a:ln>
-            </p:spPr>
-            <p:style>
-              <a:lnRef idx="2">
-                <a:schemeClr val="accent1">
-                  <a:shade val="50000"/>
-                </a:schemeClr>
-              </a:lnRef>
-              <a:fillRef idx="1">
-                <a:schemeClr val="accent1"/>
-              </a:fillRef>
-              <a:effectRef idx="0">
-                <a:schemeClr val="accent1"/>
-              </a:effectRef>
-              <a:fontRef idx="minor">
-                <a:schemeClr val="lt1"/>
-              </a:fontRef>
-            </p:style>
-            <p:txBody>
-              <a:bodyPr rtlCol="0" anchor="ctr"/>
-              <a:lstStyle/>
-              <a:p>
-                <a:pPr algn="ctr"/>
-                <a:r>
-                  <a:rPr lang="es-ES" sz="4000" b="1" dirty="0" smtClean="0">
-                    <a:solidFill>
-                      <a:srgbClr val="FF0000"/>
-                    </a:solidFill>
-                    <a:latin typeface="Century Gothic" panose="020B0502020202020204" pitchFamily="34" charset="0"/>
-                  </a:rPr>
-                  <a:t>Y</a:t>
-                </a:r>
-                <a:endParaRPr lang="es-ES" sz="4000" b="1" dirty="0">
-                  <a:solidFill>
-                    <a:srgbClr val="FF0000"/>
-                  </a:solidFill>
-                  <a:latin typeface="Century Gothic" panose="020B0502020202020204" pitchFamily="34" charset="0"/>
-                </a:endParaRPr>
-              </a:p>
-            </p:txBody>
-          </p:sp>
-        </p:grpSp>
-      </p:grpSp>
-      <p:grpSp>
-        <p:nvGrpSpPr>
-          <p:cNvPr id="28" name="Grupo 27"/>
-          <p:cNvGrpSpPr/>
-          <p:nvPr/>
-        </p:nvGrpSpPr>
-        <p:grpSpPr>
-          <a:xfrm>
-            <a:off x="229089" y="3946318"/>
-            <a:ext cx="2704011" cy="1110343"/>
-            <a:chOff x="4428309" y="584813"/>
-            <a:chExt cx="2704011" cy="1110343"/>
-          </a:xfrm>
-        </p:grpSpPr>
-        <p:sp>
-          <p:nvSpPr>
-            <p:cNvPr id="29" name="Rectángulo 28"/>
-            <p:cNvSpPr/>
-            <p:nvPr/>
-          </p:nvSpPr>
-          <p:spPr>
-            <a:xfrm>
-              <a:off x="4428309" y="584813"/>
-              <a:ext cx="2704011" cy="1110343"/>
-            </a:xfrm>
-            <a:prstGeom prst="rect">
-              <a:avLst/>
-            </a:prstGeom>
-            <a:solidFill>
-              <a:schemeClr val="tx1"/>
-            </a:solidFill>
-            <a:ln>
-              <a:noFill/>
-            </a:ln>
-          </p:spPr>
-          <p:style>
-            <a:lnRef idx="2">
-              <a:schemeClr val="accent1">
-                <a:shade val="50000"/>
-              </a:schemeClr>
-            </a:lnRef>
-            <a:fillRef idx="1">
-              <a:schemeClr val="accent1"/>
-            </a:fillRef>
-            <a:effectRef idx="0">
-              <a:schemeClr val="accent1"/>
-            </a:effectRef>
-            <a:fontRef idx="minor">
-              <a:schemeClr val="lt1"/>
-            </a:fontRef>
-          </p:style>
-          <p:txBody>
-            <a:bodyPr rtlCol="0" anchor="ctr"/>
-            <a:lstStyle/>
-            <a:p>
-              <a:pPr algn="ctr"/>
-              <a:endParaRPr lang="es-ES"/>
-            </a:p>
-          </p:txBody>
-        </p:sp>
-        <p:grpSp>
-          <p:nvGrpSpPr>
-            <p:cNvPr id="30" name="Grupo 29"/>
-            <p:cNvGrpSpPr/>
-            <p:nvPr/>
-          </p:nvGrpSpPr>
-          <p:grpSpPr>
-            <a:xfrm>
-              <a:off x="4543863" y="826308"/>
-              <a:ext cx="2469890" cy="636732"/>
-              <a:chOff x="4543863" y="826308"/>
-              <a:chExt cx="2469890" cy="636732"/>
-            </a:xfrm>
-            <a:solidFill>
-              <a:schemeClr val="bg2">
-                <a:lumMod val="75000"/>
-              </a:schemeClr>
-            </a:solidFill>
-          </p:grpSpPr>
-          <p:sp>
-            <p:nvSpPr>
-              <p:cNvPr id="31" name="Rectángulo 30"/>
-              <p:cNvSpPr/>
-              <p:nvPr/>
-            </p:nvSpPr>
-            <p:spPr>
-              <a:xfrm>
-                <a:off x="4543863" y="836023"/>
-                <a:ext cx="470263" cy="627017"/>
-              </a:xfrm>
-              <a:prstGeom prst="rect">
-                <a:avLst/>
-              </a:prstGeom>
-              <a:grpFill/>
-              <a:ln>
-                <a:noFill/>
-              </a:ln>
-            </p:spPr>
-            <p:style>
-              <a:lnRef idx="2">
-                <a:schemeClr val="accent1">
-                  <a:shade val="50000"/>
-                </a:schemeClr>
-              </a:lnRef>
-              <a:fillRef idx="1">
-                <a:schemeClr val="accent1"/>
-              </a:fillRef>
-              <a:effectRef idx="0">
-                <a:schemeClr val="accent1"/>
-              </a:effectRef>
-              <a:fontRef idx="minor">
-                <a:schemeClr val="lt1"/>
-              </a:fontRef>
-            </p:style>
-            <p:txBody>
-              <a:bodyPr rtlCol="0" anchor="ctr"/>
-              <a:lstStyle/>
-              <a:p>
-                <a:pPr algn="ctr"/>
-                <a:r>
-                  <a:rPr lang="es-ES" sz="4000" b="1" dirty="0" smtClean="0">
-                    <a:solidFill>
-                      <a:srgbClr val="FF0000"/>
-                    </a:solidFill>
-                    <a:latin typeface="Century Gothic" panose="020B0502020202020204" pitchFamily="34" charset="0"/>
-                  </a:rPr>
-                  <a:t>X</a:t>
-                </a:r>
-                <a:endParaRPr lang="es-ES" sz="4000" b="1" dirty="0">
-                  <a:solidFill>
-                    <a:srgbClr val="FF0000"/>
-                  </a:solidFill>
-                  <a:latin typeface="Century Gothic" panose="020B0502020202020204" pitchFamily="34" charset="0"/>
-                </a:endParaRPr>
-              </a:p>
-            </p:txBody>
-          </p:sp>
-          <p:sp>
-            <p:nvSpPr>
-              <p:cNvPr id="32" name="Rectángulo 31"/>
-              <p:cNvSpPr/>
-              <p:nvPr/>
-            </p:nvSpPr>
-            <p:spPr>
-              <a:xfrm>
-                <a:off x="5035898" y="831668"/>
-                <a:ext cx="470263" cy="627017"/>
-              </a:xfrm>
-              <a:prstGeom prst="rect">
-                <a:avLst/>
-              </a:prstGeom>
-              <a:grpFill/>
-              <a:ln>
-                <a:noFill/>
-              </a:ln>
-            </p:spPr>
-            <p:style>
-              <a:lnRef idx="2">
-                <a:schemeClr val="accent1">
-                  <a:shade val="50000"/>
-                </a:schemeClr>
-              </a:lnRef>
-              <a:fillRef idx="1">
-                <a:schemeClr val="accent1"/>
-              </a:fillRef>
-              <a:effectRef idx="0">
-                <a:schemeClr val="accent1"/>
-              </a:effectRef>
-              <a:fontRef idx="minor">
-                <a:schemeClr val="lt1"/>
-              </a:fontRef>
-            </p:style>
-            <p:txBody>
-              <a:bodyPr rtlCol="0" anchor="ctr"/>
-              <a:lstStyle/>
-              <a:p>
-                <a:pPr algn="ctr"/>
-                <a:r>
-                  <a:rPr lang="es-ES" sz="4000" b="1" dirty="0" smtClean="0">
-                    <a:solidFill>
-                      <a:srgbClr val="FF0000"/>
-                    </a:solidFill>
-                    <a:latin typeface="Century Gothic" panose="020B0502020202020204" pitchFamily="34" charset="0"/>
-                  </a:rPr>
-                  <a:t>X</a:t>
-                </a:r>
-                <a:endParaRPr lang="es-ES" sz="4000" b="1" dirty="0">
-                  <a:solidFill>
-                    <a:srgbClr val="FF0000"/>
-                  </a:solidFill>
-                  <a:latin typeface="Century Gothic" panose="020B0502020202020204" pitchFamily="34" charset="0"/>
-                </a:endParaRPr>
-              </a:p>
-            </p:txBody>
-          </p:sp>
-          <p:sp>
-            <p:nvSpPr>
-              <p:cNvPr id="33" name="Rectángulo 32"/>
-              <p:cNvSpPr/>
-              <p:nvPr/>
-            </p:nvSpPr>
-            <p:spPr>
-              <a:xfrm>
-                <a:off x="5532288" y="831668"/>
-                <a:ext cx="470263" cy="627017"/>
-              </a:xfrm>
-              <a:prstGeom prst="rect">
-                <a:avLst/>
-              </a:prstGeom>
-              <a:grpFill/>
-              <a:ln>
-                <a:noFill/>
-              </a:ln>
-            </p:spPr>
-            <p:style>
-              <a:lnRef idx="2">
-                <a:schemeClr val="accent1">
-                  <a:shade val="50000"/>
-                </a:schemeClr>
-              </a:lnRef>
-              <a:fillRef idx="1">
-                <a:schemeClr val="accent1"/>
-              </a:fillRef>
-              <a:effectRef idx="0">
-                <a:schemeClr val="accent1"/>
-              </a:effectRef>
-              <a:fontRef idx="minor">
-                <a:schemeClr val="lt1"/>
-              </a:fontRef>
-            </p:style>
-            <p:txBody>
-              <a:bodyPr rtlCol="0" anchor="ctr"/>
-              <a:lstStyle/>
-              <a:p>
-                <a:pPr algn="ctr"/>
-                <a:r>
-                  <a:rPr lang="es-ES" sz="4000" b="1" dirty="0">
-                    <a:solidFill>
-                      <a:srgbClr val="FF0000"/>
-                    </a:solidFill>
-                    <a:latin typeface="Century Gothic" panose="020B0502020202020204" pitchFamily="34" charset="0"/>
-                  </a:rPr>
-                  <a:t>X</a:t>
-                </a:r>
-              </a:p>
-            </p:txBody>
-          </p:sp>
-          <p:sp>
-            <p:nvSpPr>
-              <p:cNvPr id="34" name="Rectángulo 33"/>
-              <p:cNvSpPr/>
-              <p:nvPr/>
-            </p:nvSpPr>
-            <p:spPr>
-              <a:xfrm>
-                <a:off x="6037386" y="826308"/>
-                <a:ext cx="470263" cy="632377"/>
-              </a:xfrm>
-              <a:prstGeom prst="rect">
-                <a:avLst/>
-              </a:prstGeom>
-              <a:grpFill/>
-              <a:ln>
-                <a:noFill/>
-              </a:ln>
-            </p:spPr>
-            <p:style>
-              <a:lnRef idx="2">
-                <a:schemeClr val="accent1">
-                  <a:shade val="50000"/>
-                </a:schemeClr>
-              </a:lnRef>
-              <a:fillRef idx="1">
-                <a:schemeClr val="accent1"/>
-              </a:fillRef>
-              <a:effectRef idx="0">
-                <a:schemeClr val="accent1"/>
-              </a:effectRef>
-              <a:fontRef idx="minor">
-                <a:schemeClr val="lt1"/>
-              </a:fontRef>
-            </p:style>
-            <p:txBody>
-              <a:bodyPr rtlCol="0" anchor="ctr"/>
-              <a:lstStyle/>
-              <a:p>
-                <a:pPr algn="ctr"/>
-                <a:r>
-                  <a:rPr lang="es-ES" sz="4000" b="1" dirty="0" smtClean="0">
-                    <a:solidFill>
-                      <a:srgbClr val="FF0000"/>
-                    </a:solidFill>
-                    <a:latin typeface="Century Gothic" panose="020B0502020202020204" pitchFamily="34" charset="0"/>
-                  </a:rPr>
-                  <a:t>X</a:t>
-                </a:r>
-                <a:endParaRPr lang="es-ES" sz="4000" b="1" dirty="0">
-                  <a:solidFill>
-                    <a:srgbClr val="FF0000"/>
-                  </a:solidFill>
-                  <a:latin typeface="Century Gothic" panose="020B0502020202020204" pitchFamily="34" charset="0"/>
-                </a:endParaRPr>
-              </a:p>
-            </p:txBody>
-          </p:sp>
-          <p:sp>
-            <p:nvSpPr>
-              <p:cNvPr id="35" name="Rectángulo 34"/>
-              <p:cNvSpPr/>
-              <p:nvPr/>
-            </p:nvSpPr>
-            <p:spPr>
-              <a:xfrm>
-                <a:off x="6543490" y="836021"/>
-                <a:ext cx="470263" cy="627017"/>
-              </a:xfrm>
-              <a:prstGeom prst="rect">
-                <a:avLst/>
-              </a:prstGeom>
-              <a:grpFill/>
-              <a:ln>
-                <a:noFill/>
-              </a:ln>
-            </p:spPr>
-            <p:style>
-              <a:lnRef idx="2">
-                <a:schemeClr val="accent1">
-                  <a:shade val="50000"/>
-                </a:schemeClr>
-              </a:lnRef>
-              <a:fillRef idx="1">
-                <a:schemeClr val="accent1"/>
-              </a:fillRef>
-              <a:effectRef idx="0">
-                <a:schemeClr val="accent1"/>
-              </a:effectRef>
-              <a:fontRef idx="minor">
-                <a:schemeClr val="lt1"/>
-              </a:fontRef>
-            </p:style>
-            <p:txBody>
-              <a:bodyPr rtlCol="0" anchor="ctr"/>
-              <a:lstStyle/>
-              <a:p>
-                <a:pPr algn="ctr"/>
-                <a:r>
-                  <a:rPr lang="es-ES" sz="4000" b="1" dirty="0" smtClean="0">
-                    <a:solidFill>
-                      <a:srgbClr val="FF0000"/>
-                    </a:solidFill>
-                    <a:latin typeface="Century Gothic" panose="020B0502020202020204" pitchFamily="34" charset="0"/>
-                  </a:rPr>
-                  <a:t>X</a:t>
-                </a:r>
-                <a:endParaRPr lang="es-ES" sz="4000" b="1" dirty="0">
-                  <a:solidFill>
-                    <a:srgbClr val="FF0000"/>
-                  </a:solidFill>
-                  <a:latin typeface="Century Gothic" panose="020B0502020202020204" pitchFamily="34" charset="0"/>
-                </a:endParaRPr>
-              </a:p>
-            </p:txBody>
-          </p:sp>
-        </p:grpSp>
-      </p:grpSp>
-      <p:grpSp>
-        <p:nvGrpSpPr>
-          <p:cNvPr id="36" name="Grupo 35"/>
-          <p:cNvGrpSpPr/>
-          <p:nvPr/>
-        </p:nvGrpSpPr>
-        <p:grpSpPr>
-          <a:xfrm>
-            <a:off x="229089" y="2828612"/>
-            <a:ext cx="2704011" cy="1110343"/>
-            <a:chOff x="4428309" y="584813"/>
-            <a:chExt cx="2704011" cy="1110343"/>
-          </a:xfrm>
-        </p:grpSpPr>
-        <p:sp>
-          <p:nvSpPr>
-            <p:cNvPr id="37" name="Rectángulo 36"/>
-            <p:cNvSpPr/>
-            <p:nvPr/>
-          </p:nvSpPr>
-          <p:spPr>
-            <a:xfrm>
-              <a:off x="4428309" y="584813"/>
-              <a:ext cx="2704011" cy="1110343"/>
-            </a:xfrm>
-            <a:prstGeom prst="rect">
-              <a:avLst/>
-            </a:prstGeom>
-            <a:solidFill>
-              <a:schemeClr val="tx1"/>
-            </a:solidFill>
-            <a:ln>
-              <a:noFill/>
-            </a:ln>
-          </p:spPr>
-          <p:style>
-            <a:lnRef idx="2">
-              <a:schemeClr val="accent1">
-                <a:shade val="50000"/>
-              </a:schemeClr>
-            </a:lnRef>
-            <a:fillRef idx="1">
-              <a:schemeClr val="accent1"/>
-            </a:fillRef>
-            <a:effectRef idx="0">
-              <a:schemeClr val="accent1"/>
-            </a:effectRef>
-            <a:fontRef idx="minor">
-              <a:schemeClr val="lt1"/>
-            </a:fontRef>
-          </p:style>
-          <p:txBody>
-            <a:bodyPr rtlCol="0" anchor="ctr"/>
-            <a:lstStyle/>
-            <a:p>
-              <a:pPr algn="ctr"/>
-              <a:endParaRPr lang="es-ES"/>
-            </a:p>
-          </p:txBody>
-        </p:sp>
-        <p:grpSp>
-          <p:nvGrpSpPr>
-            <p:cNvPr id="38" name="Grupo 37"/>
-            <p:cNvGrpSpPr/>
-            <p:nvPr/>
-          </p:nvGrpSpPr>
-          <p:grpSpPr>
-            <a:xfrm>
-              <a:off x="4543863" y="826308"/>
-              <a:ext cx="2469890" cy="636732"/>
-              <a:chOff x="4543863" y="826308"/>
-              <a:chExt cx="2469890" cy="636732"/>
-            </a:xfrm>
-            <a:solidFill>
-              <a:schemeClr val="bg2">
-                <a:lumMod val="75000"/>
-              </a:schemeClr>
-            </a:solidFill>
-          </p:grpSpPr>
-          <p:sp>
-            <p:nvSpPr>
-              <p:cNvPr id="39" name="Rectángulo 38"/>
-              <p:cNvSpPr/>
-              <p:nvPr/>
-            </p:nvSpPr>
-            <p:spPr>
-              <a:xfrm>
-                <a:off x="4543863" y="836023"/>
-                <a:ext cx="470263" cy="627017"/>
-              </a:xfrm>
-              <a:prstGeom prst="rect">
-                <a:avLst/>
-              </a:prstGeom>
-              <a:grpFill/>
-              <a:ln>
-                <a:noFill/>
-              </a:ln>
-            </p:spPr>
-            <p:style>
-              <a:lnRef idx="2">
-                <a:schemeClr val="accent1">
-                  <a:shade val="50000"/>
-                </a:schemeClr>
-              </a:lnRef>
-              <a:fillRef idx="1">
-                <a:schemeClr val="accent1"/>
-              </a:fillRef>
-              <a:effectRef idx="0">
-                <a:schemeClr val="accent1"/>
-              </a:effectRef>
-              <a:fontRef idx="minor">
-                <a:schemeClr val="lt1"/>
-              </a:fontRef>
-            </p:style>
-            <p:txBody>
-              <a:bodyPr rtlCol="0" anchor="ctr"/>
-              <a:lstStyle/>
-              <a:p>
-                <a:pPr algn="ctr"/>
-                <a:r>
-                  <a:rPr lang="es-ES" sz="4000" b="1" dirty="0">
-                    <a:solidFill>
-                      <a:srgbClr val="FF0000"/>
-                    </a:solidFill>
-                    <a:latin typeface="Century Gothic" panose="020B0502020202020204" pitchFamily="34" charset="0"/>
-                  </a:rPr>
-                  <a:t>0</a:t>
-                </a:r>
-              </a:p>
-            </p:txBody>
-          </p:sp>
-          <p:sp>
-            <p:nvSpPr>
-              <p:cNvPr id="40" name="Rectángulo 39"/>
-              <p:cNvSpPr/>
-              <p:nvPr/>
-            </p:nvSpPr>
-            <p:spPr>
-              <a:xfrm>
-                <a:off x="5035898" y="831668"/>
-                <a:ext cx="470263" cy="627017"/>
-              </a:xfrm>
-              <a:prstGeom prst="rect">
-                <a:avLst/>
-              </a:prstGeom>
-              <a:grpFill/>
-              <a:ln>
-                <a:noFill/>
-              </a:ln>
-            </p:spPr>
-            <p:style>
-              <a:lnRef idx="2">
-                <a:schemeClr val="accent1">
-                  <a:shade val="50000"/>
-                </a:schemeClr>
-              </a:lnRef>
-              <a:fillRef idx="1">
-                <a:schemeClr val="accent1"/>
-              </a:fillRef>
-              <a:effectRef idx="0">
-                <a:schemeClr val="accent1"/>
-              </a:effectRef>
-              <a:fontRef idx="minor">
-                <a:schemeClr val="lt1"/>
-              </a:fontRef>
-            </p:style>
-            <p:txBody>
-              <a:bodyPr rtlCol="0" anchor="ctr"/>
-              <a:lstStyle/>
-              <a:p>
-                <a:pPr algn="ctr"/>
-                <a:r>
-                  <a:rPr lang="es-ES" sz="4000" b="1" dirty="0" smtClean="0">
-                    <a:solidFill>
-                      <a:srgbClr val="FF0000"/>
-                    </a:solidFill>
-                    <a:latin typeface="Century Gothic" panose="020B0502020202020204" pitchFamily="34" charset="0"/>
-                  </a:rPr>
-                  <a:t>0</a:t>
-                </a:r>
-                <a:endParaRPr lang="es-ES" sz="4000" b="1" dirty="0">
-                  <a:solidFill>
-                    <a:srgbClr val="FF0000"/>
-                  </a:solidFill>
-                  <a:latin typeface="Century Gothic" panose="020B0502020202020204" pitchFamily="34" charset="0"/>
-                </a:endParaRPr>
-              </a:p>
-            </p:txBody>
-          </p:sp>
-          <p:sp>
-            <p:nvSpPr>
-              <p:cNvPr id="41" name="Rectángulo 40"/>
-              <p:cNvSpPr/>
-              <p:nvPr/>
-            </p:nvSpPr>
-            <p:spPr>
-              <a:xfrm>
-                <a:off x="5532288" y="831668"/>
-                <a:ext cx="470263" cy="627017"/>
-              </a:xfrm>
-              <a:prstGeom prst="rect">
-                <a:avLst/>
-              </a:prstGeom>
-              <a:grpFill/>
-              <a:ln>
-                <a:noFill/>
-              </a:ln>
-            </p:spPr>
-            <p:style>
-              <a:lnRef idx="2">
-                <a:schemeClr val="accent1">
-                  <a:shade val="50000"/>
-                </a:schemeClr>
-              </a:lnRef>
-              <a:fillRef idx="1">
-                <a:schemeClr val="accent1"/>
-              </a:fillRef>
-              <a:effectRef idx="0">
-                <a:schemeClr val="accent1"/>
-              </a:effectRef>
-              <a:fontRef idx="minor">
-                <a:schemeClr val="lt1"/>
-              </a:fontRef>
-            </p:style>
-            <p:txBody>
-              <a:bodyPr rtlCol="0" anchor="ctr"/>
-              <a:lstStyle/>
-              <a:p>
-                <a:pPr algn="ctr"/>
-                <a:r>
-                  <a:rPr lang="es-ES" sz="4000" b="1" dirty="0" smtClean="0">
-                    <a:solidFill>
-                      <a:srgbClr val="FF0000"/>
-                    </a:solidFill>
-                    <a:latin typeface="Century Gothic" panose="020B0502020202020204" pitchFamily="34" charset="0"/>
-                  </a:rPr>
-                  <a:t>0</a:t>
-                </a:r>
-                <a:endParaRPr lang="es-ES" sz="4000" b="1" dirty="0">
-                  <a:solidFill>
-                    <a:srgbClr val="FF0000"/>
-                  </a:solidFill>
-                  <a:latin typeface="Century Gothic" panose="020B0502020202020204" pitchFamily="34" charset="0"/>
-                </a:endParaRPr>
-              </a:p>
-            </p:txBody>
-          </p:sp>
-          <p:sp>
-            <p:nvSpPr>
-              <p:cNvPr id="42" name="Rectángulo 41"/>
-              <p:cNvSpPr/>
-              <p:nvPr/>
-            </p:nvSpPr>
-            <p:spPr>
-              <a:xfrm>
-                <a:off x="6037386" y="826308"/>
-                <a:ext cx="470263" cy="632377"/>
-              </a:xfrm>
-              <a:prstGeom prst="rect">
-                <a:avLst/>
-              </a:prstGeom>
-              <a:grpFill/>
-              <a:ln>
-                <a:noFill/>
-              </a:ln>
-            </p:spPr>
-            <p:style>
-              <a:lnRef idx="2">
-                <a:schemeClr val="accent1">
-                  <a:shade val="50000"/>
-                </a:schemeClr>
-              </a:lnRef>
-              <a:fillRef idx="1">
-                <a:schemeClr val="accent1"/>
-              </a:fillRef>
-              <a:effectRef idx="0">
-                <a:schemeClr val="accent1"/>
-              </a:effectRef>
-              <a:fontRef idx="minor">
-                <a:schemeClr val="lt1"/>
-              </a:fontRef>
-            </p:style>
-            <p:txBody>
-              <a:bodyPr rtlCol="0" anchor="ctr"/>
-              <a:lstStyle/>
-              <a:p>
-                <a:pPr algn="ctr"/>
-                <a:r>
-                  <a:rPr lang="es-ES" sz="4000" b="1" dirty="0" smtClean="0">
-                    <a:solidFill>
-                      <a:srgbClr val="FF0000"/>
-                    </a:solidFill>
-                    <a:latin typeface="Century Gothic" panose="020B0502020202020204" pitchFamily="34" charset="0"/>
-                  </a:rPr>
-                  <a:t>x</a:t>
-                </a:r>
-                <a:endParaRPr lang="es-ES" sz="4000" b="1" dirty="0">
-                  <a:solidFill>
-                    <a:srgbClr val="FF0000"/>
-                  </a:solidFill>
-                  <a:latin typeface="Century Gothic" panose="020B0502020202020204" pitchFamily="34" charset="0"/>
-                </a:endParaRPr>
-              </a:p>
-            </p:txBody>
-          </p:sp>
-          <p:sp>
-            <p:nvSpPr>
-              <p:cNvPr id="43" name="Rectángulo 42"/>
-              <p:cNvSpPr/>
-              <p:nvPr/>
-            </p:nvSpPr>
-            <p:spPr>
-              <a:xfrm>
-                <a:off x="6543490" y="836021"/>
-                <a:ext cx="470263" cy="627017"/>
-              </a:xfrm>
-              <a:prstGeom prst="rect">
-                <a:avLst/>
-              </a:prstGeom>
-              <a:grpFill/>
-              <a:ln>
-                <a:noFill/>
-              </a:ln>
-            </p:spPr>
-            <p:style>
-              <a:lnRef idx="2">
-                <a:schemeClr val="accent1">
-                  <a:shade val="50000"/>
-                </a:schemeClr>
-              </a:lnRef>
-              <a:fillRef idx="1">
-                <a:schemeClr val="accent1"/>
-              </a:fillRef>
-              <a:effectRef idx="0">
-                <a:schemeClr val="accent1"/>
-              </a:effectRef>
-              <a:fontRef idx="minor">
-                <a:schemeClr val="lt1"/>
-              </a:fontRef>
-            </p:style>
-            <p:txBody>
-              <a:bodyPr rtlCol="0" anchor="ctr"/>
-              <a:lstStyle/>
-              <a:p>
-                <a:pPr algn="ctr"/>
-                <a:r>
-                  <a:rPr lang="es-ES" sz="4000" b="1" dirty="0" smtClean="0">
-                    <a:solidFill>
-                      <a:srgbClr val="FF0000"/>
-                    </a:solidFill>
-                    <a:latin typeface="Century Gothic" panose="020B0502020202020204" pitchFamily="34" charset="0"/>
-                  </a:rPr>
-                  <a:t>x</a:t>
-                </a:r>
-                <a:endParaRPr lang="es-ES" sz="4000" b="1" dirty="0">
-                  <a:solidFill>
-                    <a:srgbClr val="FF0000"/>
-                  </a:solidFill>
-                  <a:latin typeface="Century Gothic" panose="020B0502020202020204" pitchFamily="34" charset="0"/>
-                </a:endParaRPr>
-              </a:p>
-            </p:txBody>
-          </p:sp>
-        </p:grpSp>
-      </p:grpSp>
-      <p:sp>
-        <p:nvSpPr>
-          <p:cNvPr id="44" name="CuadroTexto 43"/>
-          <p:cNvSpPr txBox="1"/>
-          <p:nvPr/>
-        </p:nvSpPr>
-        <p:spPr>
-          <a:xfrm>
-            <a:off x="5454910" y="964863"/>
-            <a:ext cx="689612" cy="369332"/>
-          </a:xfrm>
-          <a:prstGeom prst="rect">
+        </p:nvSpPr>
+        <p:spPr>
+          <a:xfrm>
+            <a:off x="1201782" y="2730140"/>
+            <a:ext cx="2011680" cy="484632"/>
+          </a:xfrm>
+          <a:prstGeom prst="homePlate">
             <a:avLst/>
           </a:prstGeom>
-          <a:noFill/>
-        </p:spPr>
-        <p:txBody>
-          <a:bodyPr wrap="none" rtlCol="0">
-            <a:spAutoFit/>
-          </a:bodyPr>
-          <a:lstStyle/>
-          <a:p>
-            <a:r>
-              <a:rPr lang="es-ES" dirty="0" smtClean="0"/>
-              <a:t>Inicio</a:t>
-            </a:r>
-            <a:endParaRPr lang="es-ES" dirty="0"/>
-          </a:p>
-        </p:txBody>
-      </p:sp>
-      <p:sp>
-        <p:nvSpPr>
-          <p:cNvPr id="45" name="CuadroTexto 44"/>
-          <p:cNvSpPr txBox="1"/>
+        </p:spPr>
+        <p:style>
+          <a:lnRef idx="2">
+            <a:schemeClr val="accent1"/>
+          </a:lnRef>
+          <a:fillRef idx="1">
+            <a:schemeClr val="lt1"/>
+          </a:fillRef>
+          <a:effectRef idx="0">
+            <a:schemeClr val="accent1"/>
+          </a:effectRef>
+          <a:fontRef idx="minor">
+            <a:schemeClr val="dk1"/>
+          </a:fontRef>
+        </p:style>
+        <p:txBody>
+          <a:bodyPr rtlCol="0" anchor="ctr"/>
+          <a:lstStyle/>
+          <a:p>
+            <a:pPr algn="ctr"/>
+            <a:r>
+              <a:rPr lang="es-ES" sz="1700" dirty="0" smtClean="0"/>
+              <a:t>Sensor inductivo de proximidad</a:t>
+            </a:r>
+            <a:endParaRPr lang="es-ES" sz="1700" dirty="0"/>
+          </a:p>
+        </p:txBody>
+      </p:sp>
+      <p:sp>
+        <p:nvSpPr>
+          <p:cNvPr id="70" name="Pentágono 69"/>
+          <p:cNvSpPr/>
           <p:nvPr/>
         </p:nvSpPr>
         <p:spPr>
           <a:xfrm>
-            <a:off x="5454909" y="2068004"/>
-            <a:ext cx="2880019" cy="369332"/>
-          </a:xfrm>
-          <a:prstGeom prst="rect">
+            <a:off x="1197426" y="3509556"/>
+            <a:ext cx="2011680" cy="484632"/>
+          </a:xfrm>
+          <a:prstGeom prst="homePlate">
             <a:avLst/>
           </a:prstGeom>
-          <a:noFill/>
-        </p:spPr>
-        <p:txBody>
-          <a:bodyPr wrap="none" rtlCol="0">
-            <a:spAutoFit/>
-          </a:bodyPr>
-          <a:lstStyle/>
-          <a:p>
-            <a:r>
-              <a:rPr lang="es-ES" dirty="0" smtClean="0"/>
-              <a:t>Se detectó la tarjeta maestra</a:t>
-            </a:r>
-            <a:endParaRPr lang="es-ES" dirty="0"/>
-          </a:p>
-        </p:txBody>
-      </p:sp>
-      <p:sp>
-        <p:nvSpPr>
-          <p:cNvPr id="46" name="CuadroTexto 45"/>
-          <p:cNvSpPr txBox="1"/>
+        </p:spPr>
+        <p:style>
+          <a:lnRef idx="2">
+            <a:schemeClr val="accent1"/>
+          </a:lnRef>
+          <a:fillRef idx="1">
+            <a:schemeClr val="lt1"/>
+          </a:fillRef>
+          <a:effectRef idx="0">
+            <a:schemeClr val="accent1"/>
+          </a:effectRef>
+          <a:fontRef idx="minor">
+            <a:schemeClr val="dk1"/>
+          </a:fontRef>
+        </p:style>
+        <p:txBody>
+          <a:bodyPr rtlCol="0" anchor="ctr"/>
+          <a:lstStyle/>
+          <a:p>
+            <a:pPr algn="ctr"/>
+            <a:r>
+              <a:rPr lang="es-ES" sz="1700" dirty="0" smtClean="0"/>
+              <a:t>Sensor infrarrojo de presencia</a:t>
+            </a:r>
+            <a:endParaRPr lang="es-ES" sz="1700" dirty="0"/>
+          </a:p>
+        </p:txBody>
+      </p:sp>
+      <p:sp>
+        <p:nvSpPr>
+          <p:cNvPr id="71" name="Pentágono 70"/>
+          <p:cNvSpPr/>
           <p:nvPr/>
         </p:nvSpPr>
         <p:spPr>
           <a:xfrm>
-            <a:off x="5454909" y="3208662"/>
-            <a:ext cx="4038350" cy="369332"/>
-          </a:xfrm>
-          <a:prstGeom prst="rect">
+            <a:off x="1197426" y="4288972"/>
+            <a:ext cx="2011680" cy="484632"/>
+          </a:xfrm>
+          <a:prstGeom prst="homePlate">
             <a:avLst/>
           </a:prstGeom>
-          <a:noFill/>
-        </p:spPr>
-        <p:txBody>
-          <a:bodyPr wrap="none" rtlCol="0">
-            <a:spAutoFit/>
-          </a:bodyPr>
-          <a:lstStyle/>
-          <a:p>
-            <a:r>
-              <a:rPr lang="es-ES" dirty="0" smtClean="0"/>
-              <a:t>Se detectó la tarjeta operario xx (1 al 19)</a:t>
-            </a:r>
-            <a:endParaRPr lang="es-ES" dirty="0"/>
-          </a:p>
-        </p:txBody>
-      </p:sp>
-      <p:sp>
-        <p:nvSpPr>
-          <p:cNvPr id="47" name="CuadroTexto 46"/>
-          <p:cNvSpPr txBox="1"/>
+        </p:spPr>
+        <p:style>
+          <a:lnRef idx="2">
+            <a:schemeClr val="accent1"/>
+          </a:lnRef>
+          <a:fillRef idx="1">
+            <a:schemeClr val="lt1"/>
+          </a:fillRef>
+          <a:effectRef idx="0">
+            <a:schemeClr val="accent1"/>
+          </a:effectRef>
+          <a:fontRef idx="minor">
+            <a:schemeClr val="dk1"/>
+          </a:fontRef>
+        </p:style>
+        <p:txBody>
+          <a:bodyPr rtlCol="0" anchor="ctr"/>
+          <a:lstStyle/>
+          <a:p>
+            <a:pPr algn="ctr"/>
+            <a:r>
+              <a:rPr lang="es-ES" sz="1700" dirty="0" smtClean="0"/>
+              <a:t>Teclado de 16 teclas</a:t>
+            </a:r>
+            <a:endParaRPr lang="es-ES" sz="1700" dirty="0"/>
+          </a:p>
+        </p:txBody>
+      </p:sp>
+      <p:sp>
+        <p:nvSpPr>
+          <p:cNvPr id="72" name="Pentágono 71"/>
+          <p:cNvSpPr/>
           <p:nvPr/>
         </p:nvSpPr>
         <p:spPr>
           <a:xfrm>
-            <a:off x="5471653" y="4326368"/>
-            <a:ext cx="3211713" cy="369332"/>
-          </a:xfrm>
-          <a:prstGeom prst="rect">
+            <a:off x="1197426" y="5068388"/>
+            <a:ext cx="2011680" cy="484632"/>
+          </a:xfrm>
+          <a:prstGeom prst="homePlate">
             <a:avLst/>
           </a:prstGeom>
-          <a:noFill/>
-        </p:spPr>
-        <p:txBody>
-          <a:bodyPr wrap="none" rtlCol="0">
-            <a:spAutoFit/>
-          </a:bodyPr>
-          <a:lstStyle/>
-          <a:p>
-            <a:r>
-              <a:rPr lang="es-ES" dirty="0" smtClean="0"/>
-              <a:t>Cantidad de pliegos troquelados</a:t>
-            </a:r>
-            <a:endParaRPr lang="es-ES" dirty="0"/>
-          </a:p>
-        </p:txBody>
-      </p:sp>
-      <p:sp>
-        <p:nvSpPr>
-          <p:cNvPr id="48" name="CuadroTexto 47"/>
-          <p:cNvSpPr txBox="1"/>
+        </p:spPr>
+        <p:style>
+          <a:lnRef idx="2">
+            <a:schemeClr val="accent1"/>
+          </a:lnRef>
+          <a:fillRef idx="1">
+            <a:schemeClr val="lt1"/>
+          </a:fillRef>
+          <a:effectRef idx="0">
+            <a:schemeClr val="accent1"/>
+          </a:effectRef>
+          <a:fontRef idx="minor">
+            <a:schemeClr val="dk1"/>
+          </a:fontRef>
+        </p:style>
+        <p:txBody>
+          <a:bodyPr rtlCol="0" anchor="ctr"/>
+          <a:lstStyle/>
+          <a:p>
+            <a:pPr algn="ctr"/>
+            <a:r>
+              <a:rPr lang="es-ES" sz="1700" dirty="0" smtClean="0"/>
+              <a:t>Lector de tarjetas RFID</a:t>
+            </a:r>
+          </a:p>
+        </p:txBody>
+      </p:sp>
+      <p:sp>
+        <p:nvSpPr>
+          <p:cNvPr id="3" name="Rectángulo redondeado 2"/>
+          <p:cNvSpPr/>
           <p:nvPr/>
         </p:nvSpPr>
         <p:spPr>
           <a:xfrm>
-            <a:off x="5471653" y="5444074"/>
-            <a:ext cx="3358099" cy="369332"/>
-          </a:xfrm>
-          <a:prstGeom prst="rect">
+            <a:off x="5240389" y="3214772"/>
+            <a:ext cx="2011680" cy="1853616"/>
+          </a:xfrm>
+          <a:prstGeom prst="roundRect">
             <a:avLst/>
           </a:prstGeom>
-          <a:noFill/>
-        </p:spPr>
-        <p:txBody>
-          <a:bodyPr wrap="none" rtlCol="0">
-            <a:spAutoFit/>
+        </p:spPr>
+        <p:style>
+          <a:lnRef idx="2">
+            <a:schemeClr val="accent1"/>
+          </a:lnRef>
+          <a:fillRef idx="1">
+            <a:schemeClr val="lt1"/>
+          </a:fillRef>
+          <a:effectRef idx="0">
+            <a:schemeClr val="accent1"/>
+          </a:effectRef>
+          <a:fontRef idx="minor">
+            <a:schemeClr val="dk1"/>
+          </a:fontRef>
+        </p:style>
+        <p:txBody>
+          <a:bodyPr rot="0" spcFirstLastPara="0" vertOverflow="overflow" horzOverflow="overflow" vert="horz" wrap="square" lIns="91440" tIns="45720" rIns="91440" bIns="45720" numCol="1" spcCol="0" rtlCol="0" fromWordArt="0" anchor="ctr" anchorCtr="0" forceAA="0" compatLnSpc="1">
+            <a:prstTxWarp prst="textNoShape">
+              <a:avLst/>
+            </a:prstTxWarp>
+            <a:noAutofit/>
           </a:bodyPr>
           <a:lstStyle/>
           <a:p>
-            <a:r>
-              <a:rPr lang="es-ES" dirty="0" smtClean="0"/>
-              <a:t>Cantidad de golpes de la máquina</a:t>
-            </a:r>
-            <a:endParaRPr lang="es-ES" dirty="0"/>
-          </a:p>
-        </p:txBody>
-      </p:sp>
-      <p:sp>
-        <p:nvSpPr>
-          <p:cNvPr id="49" name="Elipse 48"/>
+            <a:pPr algn="ctr"/>
+            <a:r>
+              <a:rPr lang="es-ES" sz="1700" dirty="0" smtClean="0"/>
+              <a:t>STM32F411</a:t>
+            </a:r>
+          </a:p>
+        </p:txBody>
+      </p:sp>
+      <p:sp>
+        <p:nvSpPr>
+          <p:cNvPr id="73" name="Pantalla 72"/>
           <p:cNvSpPr/>
           <p:nvPr/>
         </p:nvSpPr>
         <p:spPr>
           <a:xfrm>
-            <a:off x="3518606" y="1049662"/>
-            <a:ext cx="182880" cy="188688"/>
-          </a:xfrm>
-          <a:prstGeom prst="ellipse">
+            <a:off x="9283352" y="3835256"/>
+            <a:ext cx="2364377" cy="612648"/>
+          </a:xfrm>
+          <a:prstGeom prst="flowChartDisplay">
             <a:avLst/>
           </a:prstGeom>
-          <a:solidFill>
-            <a:srgbClr val="820000"/>
-          </a:solidFill>
         </p:spPr>
         <p:style>
           <a:lnRef idx="2">
-            <a:schemeClr val="accent1">
-              <a:shade val="50000"/>
-            </a:schemeClr>
+            <a:schemeClr val="accent1"/>
           </a:lnRef>
           <a:fillRef idx="1">
+            <a:schemeClr val="lt1"/>
+          </a:fillRef>
+          <a:effectRef idx="0">
+            <a:schemeClr val="accent1"/>
+          </a:effectRef>
+          <a:fontRef idx="minor">
+            <a:schemeClr val="dk1"/>
+          </a:fontRef>
+        </p:style>
+        <p:txBody>
+          <a:bodyPr rot="0" spcFirstLastPara="0" vertOverflow="overflow" horzOverflow="overflow" vert="horz" wrap="square" lIns="91440" tIns="45720" rIns="91440" bIns="45720" numCol="1" spcCol="0" rtlCol="0" fromWordArt="0" anchor="ctr" anchorCtr="0" forceAA="0" compatLnSpc="1">
+            <a:prstTxWarp prst="textNoShape">
+              <a:avLst/>
+            </a:prstTxWarp>
+            <a:noAutofit/>
+          </a:bodyPr>
+          <a:lstStyle/>
+          <a:p>
+            <a:pPr algn="ctr"/>
+            <a:r>
+              <a:rPr lang="es-ES" sz="1700" dirty="0" smtClean="0"/>
+              <a:t>Pantalla </a:t>
+            </a:r>
+            <a:r>
+              <a:rPr lang="es-ES" sz="1700" dirty="0" smtClean="0"/>
+              <a:t>retro-iluminada </a:t>
+            </a:r>
+            <a:endParaRPr lang="es-ES" sz="1700" dirty="0" smtClean="0"/>
+          </a:p>
+        </p:txBody>
+      </p:sp>
+      <p:sp>
+        <p:nvSpPr>
+          <p:cNvPr id="76" name="Proceso 75"/>
+          <p:cNvSpPr/>
+          <p:nvPr/>
+        </p:nvSpPr>
+        <p:spPr>
+          <a:xfrm>
+            <a:off x="5240389" y="1463043"/>
+            <a:ext cx="2011680" cy="484632"/>
+          </a:xfrm>
+          <a:prstGeom prst="flowChartProcess">
+            <a:avLst/>
+          </a:prstGeom>
+        </p:spPr>
+        <p:style>
+          <a:lnRef idx="2">
+            <a:schemeClr val="accent1"/>
+          </a:lnRef>
+          <a:fillRef idx="1">
+            <a:schemeClr val="lt1"/>
+          </a:fillRef>
+          <a:effectRef idx="0">
+            <a:schemeClr val="accent1"/>
+          </a:effectRef>
+          <a:fontRef idx="minor">
+            <a:schemeClr val="dk1"/>
+          </a:fontRef>
+        </p:style>
+        <p:txBody>
+          <a:bodyPr rot="0" spcFirstLastPara="0" vertOverflow="overflow" horzOverflow="overflow" vert="horz" wrap="square" lIns="91440" tIns="45720" rIns="91440" bIns="45720" numCol="1" spcCol="0" rtlCol="0" fromWordArt="0" anchor="ctr" anchorCtr="0" forceAA="0" compatLnSpc="1">
+            <a:prstTxWarp prst="textNoShape">
+              <a:avLst/>
+            </a:prstTxWarp>
+            <a:noAutofit/>
+          </a:bodyPr>
+          <a:lstStyle/>
+          <a:p>
+            <a:pPr algn="ctr"/>
+            <a:r>
+              <a:rPr lang="es-ES" sz="1700" dirty="0" smtClean="0"/>
+              <a:t>Fuente de alimentación</a:t>
+            </a:r>
+          </a:p>
+        </p:txBody>
+      </p:sp>
+      <p:cxnSp>
+        <p:nvCxnSpPr>
+          <p:cNvPr id="80" name="Conector angular 79"/>
+          <p:cNvCxnSpPr>
+            <a:stCxn id="76" idx="1"/>
+            <a:endCxn id="2" idx="0"/>
+          </p:cNvCxnSpPr>
+          <p:nvPr/>
+        </p:nvCxnSpPr>
+        <p:spPr>
+          <a:xfrm rot="10800000" flipV="1">
+            <a:off x="2086465" y="1705358"/>
+            <a:ext cx="3153925" cy="1024781"/>
+          </a:xfrm>
+          <a:prstGeom prst="bentConnector2">
+            <a:avLst/>
+          </a:prstGeom>
+          <a:ln>
+            <a:tailEnd type="triangle"/>
+          </a:ln>
+        </p:spPr>
+        <p:style>
+          <a:lnRef idx="1">
+            <a:schemeClr val="accent1"/>
+          </a:lnRef>
+          <a:fillRef idx="0">
             <a:schemeClr val="accent1"/>
           </a:fillRef>
           <a:effectRef idx="0">
             <a:schemeClr val="accent1"/>
           </a:effectRef>
           <a:fontRef idx="minor">
-            <a:schemeClr val="lt1"/>
+            <a:schemeClr val="tx1"/>
           </a:fontRef>
         </p:style>
-        <p:txBody>
-          <a:bodyPr rtlCol="0" anchor="ctr"/>
-          <a:lstStyle/>
-          <a:p>
-            <a:pPr algn="ctr"/>
-            <a:endParaRPr lang="es-ES"/>
-          </a:p>
-        </p:txBody>
-      </p:sp>
-      <p:sp>
-        <p:nvSpPr>
-          <p:cNvPr id="50" name="Elipse 49"/>
-          <p:cNvSpPr/>
+      </p:cxnSp>
+      <p:cxnSp>
+        <p:nvCxnSpPr>
+          <p:cNvPr id="84" name="Conector recto de flecha 83"/>
+          <p:cNvCxnSpPr>
+            <a:stCxn id="3" idx="3"/>
+            <a:endCxn id="73" idx="1"/>
+          </p:cNvCxnSpPr>
           <p:nvPr/>
-        </p:nvSpPr>
-        <p:spPr>
-          <a:xfrm>
-            <a:off x="4536492" y="1045640"/>
-            <a:ext cx="182880" cy="188688"/>
-          </a:xfrm>
-          <a:prstGeom prst="ellipse">
+        </p:nvCxnSpPr>
+        <p:spPr>
+          <a:xfrm>
+            <a:off x="7252069" y="4141580"/>
+            <a:ext cx="2031283" cy="0"/>
+          </a:xfrm>
+          <a:prstGeom prst="straightConnector1">
             <a:avLst/>
           </a:prstGeom>
-          <a:solidFill>
-            <a:srgbClr val="365422"/>
-          </a:solidFill>
+          <a:ln>
+            <a:tailEnd type="triangle"/>
+          </a:ln>
         </p:spPr>
         <p:style>
-          <a:lnRef idx="2">
-            <a:schemeClr val="accent1">
-              <a:shade val="50000"/>
-            </a:schemeClr>
+          <a:lnRef idx="1">
+            <a:schemeClr val="accent1"/>
           </a:lnRef>
-          <a:fillRef idx="1">
+          <a:fillRef idx="0">
             <a:schemeClr val="accent1"/>
           </a:fillRef>
           <a:effectRef idx="0">
             <a:schemeClr val="accent1"/>
           </a:effectRef>
           <a:fontRef idx="minor">
-            <a:schemeClr val="lt1"/>
+            <a:schemeClr val="tx1"/>
           </a:fontRef>
         </p:style>
-        <p:txBody>
-          <a:bodyPr rtlCol="0" anchor="ctr"/>
-          <a:lstStyle/>
-          <a:p>
-            <a:pPr algn="ctr"/>
-            <a:endParaRPr lang="es-ES"/>
-          </a:p>
-        </p:txBody>
-      </p:sp>
-      <p:sp>
-        <p:nvSpPr>
-          <p:cNvPr id="51" name="Elipse 50"/>
-          <p:cNvSpPr/>
+      </p:cxnSp>
+      <p:cxnSp>
+        <p:nvCxnSpPr>
+          <p:cNvPr id="87" name="Conector angular 86"/>
+          <p:cNvCxnSpPr>
+            <a:stCxn id="2" idx="3"/>
+          </p:cNvCxnSpPr>
           <p:nvPr/>
-        </p:nvSpPr>
-        <p:spPr>
-          <a:xfrm>
-            <a:off x="3530328" y="2172730"/>
-            <a:ext cx="182880" cy="188688"/>
-          </a:xfrm>
-          <a:prstGeom prst="ellipse">
+        </p:nvCxnSpPr>
+        <p:spPr>
+          <a:xfrm>
+            <a:off x="3213462" y="2972456"/>
+            <a:ext cx="2026927" cy="537100"/>
+          </a:xfrm>
+          <a:prstGeom prst="bentConnector3">
             <a:avLst/>
           </a:prstGeom>
-          <a:solidFill>
-            <a:srgbClr val="820000"/>
-          </a:solidFill>
+          <a:ln>
+            <a:tailEnd type="triangle"/>
+          </a:ln>
         </p:spPr>
         <p:style>
-          <a:lnRef idx="2">
-            <a:schemeClr val="accent1">
-              <a:shade val="50000"/>
-            </a:schemeClr>
+          <a:lnRef idx="1">
+            <a:schemeClr val="accent1"/>
           </a:lnRef>
-          <a:fillRef idx="1">
+          <a:fillRef idx="0">
             <a:schemeClr val="accent1"/>
           </a:fillRef>
           <a:effectRef idx="0">
             <a:schemeClr val="accent1"/>
           </a:effectRef>
           <a:fontRef idx="minor">
-            <a:schemeClr val="lt1"/>
+            <a:schemeClr val="tx1"/>
           </a:fontRef>
         </p:style>
-        <p:txBody>
-          <a:bodyPr rtlCol="0" anchor="ctr"/>
-          <a:lstStyle/>
-          <a:p>
-            <a:pPr algn="ctr"/>
-            <a:endParaRPr lang="es-ES"/>
-          </a:p>
-        </p:txBody>
-      </p:sp>
-      <p:sp>
-        <p:nvSpPr>
-          <p:cNvPr id="52" name="Elipse 51"/>
-          <p:cNvSpPr/>
+      </p:cxnSp>
+      <p:cxnSp>
+        <p:nvCxnSpPr>
+          <p:cNvPr id="89" name="Conector angular 88"/>
+          <p:cNvCxnSpPr>
+            <a:stCxn id="70" idx="3"/>
+          </p:cNvCxnSpPr>
           <p:nvPr/>
-        </p:nvSpPr>
-        <p:spPr>
-          <a:xfrm>
-            <a:off x="4548214" y="2168708"/>
-            <a:ext cx="182880" cy="188688"/>
-          </a:xfrm>
-          <a:prstGeom prst="ellipse">
+        </p:nvCxnSpPr>
+        <p:spPr>
+          <a:xfrm>
+            <a:off x="3209106" y="3751872"/>
+            <a:ext cx="2031283" cy="173626"/>
+          </a:xfrm>
+          <a:prstGeom prst="bentConnector3">
             <a:avLst/>
           </a:prstGeom>
-          <a:solidFill>
-            <a:srgbClr val="365422"/>
-          </a:solidFill>
+          <a:ln>
+            <a:tailEnd type="triangle"/>
+          </a:ln>
         </p:spPr>
         <p:style>
-          <a:lnRef idx="2">
-            <a:schemeClr val="accent1">
-              <a:shade val="50000"/>
-            </a:schemeClr>
+          <a:lnRef idx="1">
+            <a:schemeClr val="accent1"/>
           </a:lnRef>
-          <a:fillRef idx="1">
+          <a:fillRef idx="0">
             <a:schemeClr val="accent1"/>
           </a:fillRef>
           <a:effectRef idx="0">
             <a:schemeClr val="accent1"/>
           </a:effectRef>
           <a:fontRef idx="minor">
-            <a:schemeClr val="lt1"/>
+            <a:schemeClr val="tx1"/>
           </a:fontRef>
         </p:style>
-        <p:txBody>
-          <a:bodyPr rtlCol="0" anchor="ctr"/>
-          <a:lstStyle/>
-          <a:p>
-            <a:pPr algn="ctr"/>
-            <a:endParaRPr lang="es-ES"/>
-          </a:p>
-        </p:txBody>
-      </p:sp>
-      <p:sp>
-        <p:nvSpPr>
-          <p:cNvPr id="53" name="Elipse 52"/>
-          <p:cNvSpPr/>
+      </p:cxnSp>
+      <p:cxnSp>
+        <p:nvCxnSpPr>
+          <p:cNvPr id="91" name="Conector angular 90"/>
+          <p:cNvCxnSpPr>
+            <a:stCxn id="71" idx="3"/>
+          </p:cNvCxnSpPr>
           <p:nvPr/>
-        </p:nvSpPr>
-        <p:spPr>
-          <a:xfrm>
-            <a:off x="3530326" y="3298148"/>
-            <a:ext cx="182880" cy="188688"/>
-          </a:xfrm>
-          <a:prstGeom prst="ellipse">
+        </p:nvCxnSpPr>
+        <p:spPr>
+          <a:xfrm flipV="1">
+            <a:off x="3209106" y="4383896"/>
+            <a:ext cx="2031283" cy="147392"/>
+          </a:xfrm>
+          <a:prstGeom prst="bentConnector3">
             <a:avLst/>
           </a:prstGeom>
-          <a:solidFill>
-            <a:srgbClr val="820000"/>
-          </a:solidFill>
+          <a:ln>
+            <a:tailEnd type="triangle"/>
+          </a:ln>
         </p:spPr>
         <p:style>
-          <a:lnRef idx="2">
-            <a:schemeClr val="accent1">
-              <a:shade val="50000"/>
-            </a:schemeClr>
+          <a:lnRef idx="1">
+            <a:schemeClr val="accent1"/>
           </a:lnRef>
-          <a:fillRef idx="1">
+          <a:fillRef idx="0">
             <a:schemeClr val="accent1"/>
           </a:fillRef>
           <a:effectRef idx="0">
             <a:schemeClr val="accent1"/>
           </a:effectRef>
           <a:fontRef idx="minor">
-            <a:schemeClr val="lt1"/>
+            <a:schemeClr val="tx1"/>
           </a:fontRef>
         </p:style>
-        <p:txBody>
-          <a:bodyPr rtlCol="0" anchor="ctr"/>
-          <a:lstStyle/>
-          <a:p>
-            <a:pPr algn="ctr"/>
-            <a:endParaRPr lang="es-ES"/>
-          </a:p>
-        </p:txBody>
-      </p:sp>
-      <p:sp>
-        <p:nvSpPr>
-          <p:cNvPr id="54" name="Elipse 53"/>
-          <p:cNvSpPr/>
+      </p:cxnSp>
+      <p:cxnSp>
+        <p:nvCxnSpPr>
+          <p:cNvPr id="93" name="Conector angular 92"/>
+          <p:cNvCxnSpPr/>
           <p:nvPr/>
-        </p:nvSpPr>
-        <p:spPr>
-          <a:xfrm>
-            <a:off x="4548212" y="3294126"/>
-            <a:ext cx="182880" cy="188688"/>
-          </a:xfrm>
-          <a:prstGeom prst="ellipse">
+        </p:nvCxnSpPr>
+        <p:spPr>
+          <a:xfrm flipV="1">
+            <a:off x="3209106" y="4773604"/>
+            <a:ext cx="2031283" cy="524037"/>
+          </a:xfrm>
+          <a:prstGeom prst="bentConnector3">
             <a:avLst/>
           </a:prstGeom>
-          <a:solidFill>
-            <a:srgbClr val="365422"/>
-          </a:solidFill>
+          <a:ln>
+            <a:tailEnd type="triangle"/>
+          </a:ln>
         </p:spPr>
         <p:style>
-          <a:lnRef idx="2">
-            <a:schemeClr val="accent1">
-              <a:shade val="50000"/>
-            </a:schemeClr>
+          <a:lnRef idx="1">
+            <a:schemeClr val="accent1"/>
           </a:lnRef>
-          <a:fillRef idx="1">
+          <a:fillRef idx="0">
             <a:schemeClr val="accent1"/>
           </a:fillRef>
           <a:effectRef idx="0">
             <a:schemeClr val="accent1"/>
           </a:effectRef>
           <a:fontRef idx="minor">
-            <a:schemeClr val="lt1"/>
+            <a:schemeClr val="tx1"/>
           </a:fontRef>
         </p:style>
-        <p:txBody>
-          <a:bodyPr rtlCol="0" anchor="ctr"/>
-          <a:lstStyle/>
-          <a:p>
-            <a:pPr algn="ctr"/>
-            <a:endParaRPr lang="es-ES"/>
-          </a:p>
-        </p:txBody>
-      </p:sp>
-      <p:sp>
-        <p:nvSpPr>
-          <p:cNvPr id="55" name="Elipse 54"/>
+      </p:cxnSp>
+      <p:sp>
+        <p:nvSpPr>
+          <p:cNvPr id="102" name="CuadroTexto 101"/>
+          <p:cNvSpPr txBox="1"/>
+          <p:nvPr/>
+        </p:nvSpPr>
+        <p:spPr>
+          <a:xfrm>
+            <a:off x="3520654" y="2608982"/>
+            <a:ext cx="380232" cy="353943"/>
+          </a:xfrm>
+          <a:prstGeom prst="rect">
+            <a:avLst/>
+          </a:prstGeom>
+          <a:noFill/>
+        </p:spPr>
+        <p:txBody>
+          <a:bodyPr wrap="none" rtlCol="0">
+            <a:spAutoFit/>
+          </a:bodyPr>
+          <a:lstStyle/>
+          <a:p>
+            <a:r>
+              <a:rPr lang="es-ES" sz="1700" dirty="0" smtClean="0"/>
+              <a:t>/1</a:t>
+            </a:r>
+            <a:endParaRPr lang="es-ES" sz="1700" dirty="0"/>
+          </a:p>
+        </p:txBody>
+      </p:sp>
+      <p:sp>
+        <p:nvSpPr>
+          <p:cNvPr id="103" name="CuadroTexto 102"/>
+          <p:cNvSpPr txBox="1"/>
+          <p:nvPr/>
+        </p:nvSpPr>
+        <p:spPr>
+          <a:xfrm>
+            <a:off x="3516299" y="3378910"/>
+            <a:ext cx="380232" cy="353943"/>
+          </a:xfrm>
+          <a:prstGeom prst="rect">
+            <a:avLst/>
+          </a:prstGeom>
+          <a:noFill/>
+        </p:spPr>
+        <p:txBody>
+          <a:bodyPr wrap="none" rtlCol="0">
+            <a:spAutoFit/>
+          </a:bodyPr>
+          <a:lstStyle/>
+          <a:p>
+            <a:r>
+              <a:rPr lang="es-ES" sz="1700" dirty="0" smtClean="0"/>
+              <a:t>/3</a:t>
+            </a:r>
+            <a:endParaRPr lang="es-ES" sz="1700" dirty="0"/>
+          </a:p>
+        </p:txBody>
+      </p:sp>
+      <p:sp>
+        <p:nvSpPr>
+          <p:cNvPr id="104" name="CuadroTexto 103"/>
+          <p:cNvSpPr txBox="1"/>
+          <p:nvPr/>
+        </p:nvSpPr>
+        <p:spPr>
+          <a:xfrm>
+            <a:off x="3516299" y="4161956"/>
+            <a:ext cx="380232" cy="353943"/>
+          </a:xfrm>
+          <a:prstGeom prst="rect">
+            <a:avLst/>
+          </a:prstGeom>
+          <a:noFill/>
+        </p:spPr>
+        <p:txBody>
+          <a:bodyPr wrap="none" rtlCol="0">
+            <a:spAutoFit/>
+          </a:bodyPr>
+          <a:lstStyle/>
+          <a:p>
+            <a:r>
+              <a:rPr lang="es-ES" sz="1700" dirty="0" smtClean="0"/>
+              <a:t>/8</a:t>
+            </a:r>
+            <a:endParaRPr lang="es-ES" sz="1700" dirty="0"/>
+          </a:p>
+        </p:txBody>
+      </p:sp>
+      <p:sp>
+        <p:nvSpPr>
+          <p:cNvPr id="105" name="CuadroTexto 104"/>
+          <p:cNvSpPr txBox="1"/>
+          <p:nvPr/>
+        </p:nvSpPr>
+        <p:spPr>
+          <a:xfrm>
+            <a:off x="3511944" y="4931884"/>
+            <a:ext cx="380232" cy="353943"/>
+          </a:xfrm>
+          <a:prstGeom prst="rect">
+            <a:avLst/>
+          </a:prstGeom>
+          <a:noFill/>
+        </p:spPr>
+        <p:txBody>
+          <a:bodyPr wrap="none" rtlCol="0">
+            <a:spAutoFit/>
+          </a:bodyPr>
+          <a:lstStyle/>
+          <a:p>
+            <a:r>
+              <a:rPr lang="es-ES" sz="1700" dirty="0" smtClean="0"/>
+              <a:t>/7</a:t>
+            </a:r>
+          </a:p>
+        </p:txBody>
+      </p:sp>
+      <p:sp>
+        <p:nvSpPr>
+          <p:cNvPr id="106" name="CuadroTexto 105"/>
+          <p:cNvSpPr txBox="1"/>
+          <p:nvPr/>
+        </p:nvSpPr>
+        <p:spPr>
+          <a:xfrm>
+            <a:off x="2086465" y="2028750"/>
+            <a:ext cx="380232" cy="353943"/>
+          </a:xfrm>
+          <a:prstGeom prst="rect">
+            <a:avLst/>
+          </a:prstGeom>
+          <a:noFill/>
+        </p:spPr>
+        <p:txBody>
+          <a:bodyPr wrap="none" rtlCol="0">
+            <a:spAutoFit/>
+          </a:bodyPr>
+          <a:lstStyle/>
+          <a:p>
+            <a:r>
+              <a:rPr lang="es-ES" sz="1700" dirty="0" smtClean="0"/>
+              <a:t>/2</a:t>
+            </a:r>
+            <a:endParaRPr lang="es-ES" sz="1700" dirty="0"/>
+          </a:p>
+        </p:txBody>
+      </p:sp>
+      <p:sp>
+        <p:nvSpPr>
+          <p:cNvPr id="107" name="Proceso 106"/>
           <p:cNvSpPr/>
           <p:nvPr/>
         </p:nvSpPr>
         <p:spPr>
           <a:xfrm>
-            <a:off x="3542048" y="4421216"/>
-            <a:ext cx="182880" cy="188688"/>
-          </a:xfrm>
-          <a:prstGeom prst="ellipse">
+            <a:off x="5240389" y="2338583"/>
+            <a:ext cx="2011680" cy="484632"/>
+          </a:xfrm>
+          <a:prstGeom prst="flowChartProcess">
             <a:avLst/>
           </a:prstGeom>
-          <a:solidFill>
-            <a:srgbClr val="820000"/>
-          </a:solidFill>
         </p:spPr>
         <p:style>
           <a:lnRef idx="2">
-            <a:schemeClr val="accent1">
-              <a:shade val="50000"/>
-            </a:schemeClr>
+            <a:schemeClr val="accent1"/>
           </a:lnRef>
           <a:fillRef idx="1">
+            <a:schemeClr val="lt1"/>
+          </a:fillRef>
+          <a:effectRef idx="0">
+            <a:schemeClr val="accent1"/>
+          </a:effectRef>
+          <a:fontRef idx="minor">
+            <a:schemeClr val="dk1"/>
+          </a:fontRef>
+        </p:style>
+        <p:txBody>
+          <a:bodyPr rot="0" spcFirstLastPara="0" vertOverflow="overflow" horzOverflow="overflow" vert="horz" wrap="square" lIns="91440" tIns="45720" rIns="91440" bIns="45720" numCol="1" spcCol="0" rtlCol="0" fromWordArt="0" anchor="ctr" anchorCtr="0" forceAA="0" compatLnSpc="1">
+            <a:prstTxWarp prst="textNoShape">
+              <a:avLst/>
+            </a:prstTxWarp>
+            <a:noAutofit/>
+          </a:bodyPr>
+          <a:lstStyle/>
+          <a:p>
+            <a:pPr algn="ctr"/>
+            <a:r>
+              <a:rPr lang="es-ES" sz="1700" dirty="0" smtClean="0"/>
+              <a:t>Regulador de tensión</a:t>
+            </a:r>
+            <a:endParaRPr lang="es-ES" sz="1700" dirty="0" smtClean="0"/>
+          </a:p>
+        </p:txBody>
+      </p:sp>
+      <p:cxnSp>
+        <p:nvCxnSpPr>
+          <p:cNvPr id="109" name="Conector recto de flecha 108"/>
+          <p:cNvCxnSpPr>
+            <a:stCxn id="76" idx="2"/>
+            <a:endCxn id="107" idx="0"/>
+          </p:cNvCxnSpPr>
+          <p:nvPr/>
+        </p:nvCxnSpPr>
+        <p:spPr>
+          <a:xfrm>
+            <a:off x="6246229" y="1947675"/>
+            <a:ext cx="0" cy="390908"/>
+          </a:xfrm>
+          <a:prstGeom prst="straightConnector1">
+            <a:avLst/>
+          </a:prstGeom>
+          <a:ln>
+            <a:tailEnd type="triangle"/>
+          </a:ln>
+        </p:spPr>
+        <p:style>
+          <a:lnRef idx="1">
+            <a:schemeClr val="accent1"/>
+          </a:lnRef>
+          <a:fillRef idx="0">
             <a:schemeClr val="accent1"/>
           </a:fillRef>
           <a:effectRef idx="0">
             <a:schemeClr val="accent1"/>
           </a:effectRef>
           <a:fontRef idx="minor">
-            <a:schemeClr val="lt1"/>
+            <a:schemeClr val="tx1"/>
           </a:fontRef>
         </p:style>
-        <p:txBody>
-          <a:bodyPr rtlCol="0" anchor="ctr"/>
-          <a:lstStyle/>
-          <a:p>
-            <a:pPr algn="ctr"/>
-            <a:endParaRPr lang="es-ES"/>
-          </a:p>
-        </p:txBody>
-      </p:sp>
-      <p:sp>
-        <p:nvSpPr>
-          <p:cNvPr id="56" name="Elipse 55"/>
-          <p:cNvSpPr/>
+      </p:cxnSp>
+      <p:cxnSp>
+        <p:nvCxnSpPr>
+          <p:cNvPr id="111" name="Conector recto de flecha 110"/>
+          <p:cNvCxnSpPr>
+            <a:stCxn id="107" idx="2"/>
+            <a:endCxn id="3" idx="0"/>
+          </p:cNvCxnSpPr>
           <p:nvPr/>
-        </p:nvSpPr>
-        <p:spPr>
-          <a:xfrm>
-            <a:off x="4559934" y="4417194"/>
-            <a:ext cx="182880" cy="188688"/>
-          </a:xfrm>
-          <a:prstGeom prst="ellipse">
+        </p:nvCxnSpPr>
+        <p:spPr>
+          <a:xfrm>
+            <a:off x="6246229" y="2823215"/>
+            <a:ext cx="0" cy="391557"/>
+          </a:xfrm>
+          <a:prstGeom prst="straightConnector1">
             <a:avLst/>
           </a:prstGeom>
-          <a:solidFill>
-            <a:srgbClr val="00FA00"/>
-          </a:solidFill>
+          <a:ln>
+            <a:tailEnd type="triangle"/>
+          </a:ln>
         </p:spPr>
         <p:style>
-          <a:lnRef idx="2">
-            <a:schemeClr val="accent1">
-              <a:shade val="50000"/>
-            </a:schemeClr>
+          <a:lnRef idx="1">
+            <a:schemeClr val="accent1"/>
           </a:lnRef>
-          <a:fillRef idx="1">
+          <a:fillRef idx="0">
             <a:schemeClr val="accent1"/>
           </a:fillRef>
           <a:effectRef idx="0">
             <a:schemeClr val="accent1"/>
           </a:effectRef>
           <a:fontRef idx="minor">
-            <a:schemeClr val="lt1"/>
+            <a:schemeClr val="tx1"/>
           </a:fontRef>
         </p:style>
-        <p:txBody>
-          <a:bodyPr rtlCol="0" anchor="ctr"/>
-          <a:lstStyle/>
-          <a:p>
-            <a:pPr algn="ctr"/>
-            <a:endParaRPr lang="es-ES"/>
-          </a:p>
-        </p:txBody>
-      </p:sp>
-      <p:sp>
-        <p:nvSpPr>
-          <p:cNvPr id="57" name="Elipse 56"/>
-          <p:cNvSpPr/>
-          <p:nvPr/>
-        </p:nvSpPr>
-        <p:spPr>
-          <a:xfrm>
-            <a:off x="3553770" y="5558359"/>
-            <a:ext cx="182880" cy="188688"/>
-          </a:xfrm>
-          <a:prstGeom prst="ellipse">
-            <a:avLst/>
-          </a:prstGeom>
-          <a:solidFill>
-            <a:srgbClr val="FA0000"/>
-          </a:solidFill>
-        </p:spPr>
-        <p:style>
-          <a:lnRef idx="2">
-            <a:schemeClr val="accent1">
-              <a:shade val="50000"/>
-            </a:schemeClr>
-          </a:lnRef>
-          <a:fillRef idx="1">
-            <a:schemeClr val="accent1"/>
-          </a:fillRef>
-          <a:effectRef idx="0">
-            <a:schemeClr val="accent1"/>
-          </a:effectRef>
-          <a:fontRef idx="minor">
-            <a:schemeClr val="lt1"/>
-          </a:fontRef>
-        </p:style>
-        <p:txBody>
-          <a:bodyPr rtlCol="0" anchor="ctr"/>
-          <a:lstStyle/>
-          <a:p>
-            <a:pPr algn="ctr"/>
-            <a:endParaRPr lang="es-ES"/>
-          </a:p>
-        </p:txBody>
-      </p:sp>
-      <p:sp>
-        <p:nvSpPr>
-          <p:cNvPr id="58" name="Elipse 57"/>
-          <p:cNvSpPr/>
-          <p:nvPr/>
-        </p:nvSpPr>
-        <p:spPr>
-          <a:xfrm>
-            <a:off x="4571656" y="5554337"/>
-            <a:ext cx="182880" cy="188688"/>
-          </a:xfrm>
-          <a:prstGeom prst="ellipse">
-            <a:avLst/>
-          </a:prstGeom>
-          <a:solidFill>
-            <a:srgbClr val="365422"/>
-          </a:solidFill>
-        </p:spPr>
-        <p:style>
-          <a:lnRef idx="2">
-            <a:schemeClr val="accent1">
-              <a:shade val="50000"/>
-            </a:schemeClr>
-          </a:lnRef>
-          <a:fillRef idx="1">
-            <a:schemeClr val="accent1"/>
-          </a:fillRef>
-          <a:effectRef idx="0">
-            <a:schemeClr val="accent1"/>
-          </a:effectRef>
-          <a:fontRef idx="minor">
-            <a:schemeClr val="lt1"/>
-          </a:fontRef>
-        </p:style>
-        <p:txBody>
-          <a:bodyPr rtlCol="0" anchor="ctr"/>
-          <a:lstStyle/>
-          <a:p>
-            <a:pPr algn="ctr"/>
-            <a:endParaRPr lang="es-ES"/>
-          </a:p>
-        </p:txBody>
-      </p:sp>
-      <p:sp>
-        <p:nvSpPr>
-          <p:cNvPr id="59" name="CuadroTexto 58"/>
+      </p:cxnSp>
+      <p:sp>
+        <p:nvSpPr>
+          <p:cNvPr id="23" name="CuadroTexto 22"/>
           <p:cNvSpPr txBox="1"/>
           <p:nvPr/>
         </p:nvSpPr>
         <p:spPr>
           <a:xfrm>
-            <a:off x="3205626" y="676308"/>
-            <a:ext cx="832279" cy="369332"/>
+            <a:off x="6246229" y="1971307"/>
+            <a:ext cx="380232" cy="353943"/>
           </a:xfrm>
           <a:prstGeom prst="rect">
             <a:avLst/>
@@ -5388,23 +3781,23 @@
           <a:lstStyle/>
           <a:p>
             <a:r>
-              <a:rPr lang="es-ES" dirty="0" smtClean="0"/>
-              <a:t>Golpes</a:t>
-            </a:r>
-            <a:endParaRPr lang="es-ES" dirty="0"/>
-          </a:p>
-        </p:txBody>
-      </p:sp>
-      <p:sp>
-        <p:nvSpPr>
-          <p:cNvPr id="60" name="CuadroTexto 59"/>
+              <a:rPr lang="es-ES" sz="1700" dirty="0" smtClean="0"/>
+              <a:t>/2</a:t>
+            </a:r>
+            <a:endParaRPr lang="es-ES" sz="1700" dirty="0"/>
+          </a:p>
+        </p:txBody>
+      </p:sp>
+      <p:sp>
+        <p:nvSpPr>
+          <p:cNvPr id="24" name="CuadroTexto 23"/>
           <p:cNvSpPr txBox="1"/>
           <p:nvPr/>
         </p:nvSpPr>
         <p:spPr>
           <a:xfrm>
-            <a:off x="4094773" y="672286"/>
-            <a:ext cx="1066318" cy="369332"/>
+            <a:off x="6241873" y="2829100"/>
+            <a:ext cx="380232" cy="353943"/>
           </a:xfrm>
           <a:prstGeom prst="rect">
             <a:avLst/>
@@ -5418,23 +3811,23 @@
           <a:lstStyle/>
           <a:p>
             <a:r>
-              <a:rPr lang="es-ES" dirty="0" smtClean="0"/>
-              <a:t>Unidades</a:t>
-            </a:r>
-            <a:endParaRPr lang="es-ES" dirty="0"/>
-          </a:p>
-        </p:txBody>
-      </p:sp>
-      <p:sp>
-        <p:nvSpPr>
-          <p:cNvPr id="61" name="CuadroTexto 60"/>
+              <a:rPr lang="es-ES" sz="1700" dirty="0" smtClean="0"/>
+              <a:t>/2</a:t>
+            </a:r>
+            <a:endParaRPr lang="es-ES" sz="1700" dirty="0"/>
+          </a:p>
+        </p:txBody>
+      </p:sp>
+      <p:sp>
+        <p:nvSpPr>
+          <p:cNvPr id="25" name="CuadroTexto 24"/>
           <p:cNvSpPr txBox="1"/>
           <p:nvPr/>
         </p:nvSpPr>
         <p:spPr>
           <a:xfrm>
-            <a:off x="3205626" y="1799376"/>
-            <a:ext cx="832279" cy="369332"/>
+            <a:off x="8077594" y="3836870"/>
+            <a:ext cx="380232" cy="353943"/>
           </a:xfrm>
           <a:prstGeom prst="rect">
             <a:avLst/>
@@ -5448,220 +3841,9 @@
           <a:lstStyle/>
           <a:p>
             <a:r>
-              <a:rPr lang="es-ES" dirty="0" smtClean="0"/>
-              <a:t>Golpes</a:t>
-            </a:r>
-            <a:endParaRPr lang="es-ES" dirty="0"/>
-          </a:p>
-        </p:txBody>
-      </p:sp>
-      <p:sp>
-        <p:nvSpPr>
-          <p:cNvPr id="62" name="CuadroTexto 61"/>
-          <p:cNvSpPr txBox="1"/>
-          <p:nvPr/>
-        </p:nvSpPr>
-        <p:spPr>
-          <a:xfrm>
-            <a:off x="4094773" y="1795354"/>
-            <a:ext cx="1066318" cy="369332"/>
-          </a:xfrm>
-          <a:prstGeom prst="rect">
-            <a:avLst/>
-          </a:prstGeom>
-          <a:noFill/>
-        </p:spPr>
-        <p:txBody>
-          <a:bodyPr wrap="none" rtlCol="0">
-            <a:spAutoFit/>
-          </a:bodyPr>
-          <a:lstStyle/>
-          <a:p>
-            <a:r>
-              <a:rPr lang="es-ES" dirty="0" smtClean="0"/>
-              <a:t>Unidades</a:t>
-            </a:r>
-            <a:endParaRPr lang="es-ES" dirty="0"/>
-          </a:p>
-        </p:txBody>
-      </p:sp>
-      <p:sp>
-        <p:nvSpPr>
-          <p:cNvPr id="63" name="CuadroTexto 62"/>
-          <p:cNvSpPr txBox="1"/>
-          <p:nvPr/>
-        </p:nvSpPr>
-        <p:spPr>
-          <a:xfrm>
-            <a:off x="3205626" y="2928468"/>
-            <a:ext cx="832279" cy="369332"/>
-          </a:xfrm>
-          <a:prstGeom prst="rect">
-            <a:avLst/>
-          </a:prstGeom>
-          <a:noFill/>
-        </p:spPr>
-        <p:txBody>
-          <a:bodyPr wrap="none" rtlCol="0">
-            <a:spAutoFit/>
-          </a:bodyPr>
-          <a:lstStyle/>
-          <a:p>
-            <a:r>
-              <a:rPr lang="es-ES" dirty="0" smtClean="0"/>
-              <a:t>Golpes</a:t>
-            </a:r>
-            <a:endParaRPr lang="es-ES" dirty="0"/>
-          </a:p>
-        </p:txBody>
-      </p:sp>
-      <p:sp>
-        <p:nvSpPr>
-          <p:cNvPr id="64" name="CuadroTexto 63"/>
-          <p:cNvSpPr txBox="1"/>
-          <p:nvPr/>
-        </p:nvSpPr>
-        <p:spPr>
-          <a:xfrm>
-            <a:off x="4094773" y="2924446"/>
-            <a:ext cx="1066318" cy="369332"/>
-          </a:xfrm>
-          <a:prstGeom prst="rect">
-            <a:avLst/>
-          </a:prstGeom>
-          <a:noFill/>
-        </p:spPr>
-        <p:txBody>
-          <a:bodyPr wrap="none" rtlCol="0">
-            <a:spAutoFit/>
-          </a:bodyPr>
-          <a:lstStyle/>
-          <a:p>
-            <a:r>
-              <a:rPr lang="es-ES" dirty="0" smtClean="0"/>
-              <a:t>Unidades</a:t>
-            </a:r>
-            <a:endParaRPr lang="es-ES" dirty="0"/>
-          </a:p>
-        </p:txBody>
-      </p:sp>
-      <p:sp>
-        <p:nvSpPr>
-          <p:cNvPr id="65" name="CuadroTexto 64"/>
-          <p:cNvSpPr txBox="1"/>
-          <p:nvPr/>
-        </p:nvSpPr>
-        <p:spPr>
-          <a:xfrm>
-            <a:off x="3222875" y="4047862"/>
-            <a:ext cx="832279" cy="369332"/>
-          </a:xfrm>
-          <a:prstGeom prst="rect">
-            <a:avLst/>
-          </a:prstGeom>
-          <a:noFill/>
-        </p:spPr>
-        <p:txBody>
-          <a:bodyPr wrap="none" rtlCol="0">
-            <a:spAutoFit/>
-          </a:bodyPr>
-          <a:lstStyle/>
-          <a:p>
-            <a:r>
-              <a:rPr lang="es-ES" dirty="0" smtClean="0"/>
-              <a:t>Golpes</a:t>
-            </a:r>
-            <a:endParaRPr lang="es-ES" dirty="0"/>
-          </a:p>
-        </p:txBody>
-      </p:sp>
-      <p:sp>
-        <p:nvSpPr>
-          <p:cNvPr id="66" name="CuadroTexto 65"/>
-          <p:cNvSpPr txBox="1"/>
-          <p:nvPr/>
-        </p:nvSpPr>
-        <p:spPr>
-          <a:xfrm>
-            <a:off x="4112022" y="4043840"/>
-            <a:ext cx="1066318" cy="369332"/>
-          </a:xfrm>
-          <a:prstGeom prst="rect">
-            <a:avLst/>
-          </a:prstGeom>
-          <a:noFill/>
-        </p:spPr>
-        <p:txBody>
-          <a:bodyPr wrap="none" rtlCol="0">
-            <a:spAutoFit/>
-          </a:bodyPr>
-          <a:lstStyle/>
-          <a:p>
-            <a:r>
-              <a:rPr lang="es-ES" dirty="0" smtClean="0"/>
-              <a:t>Unidades</a:t>
-            </a:r>
-            <a:endParaRPr lang="es-ES" dirty="0"/>
-          </a:p>
-        </p:txBody>
-      </p:sp>
-      <p:sp>
-        <p:nvSpPr>
-          <p:cNvPr id="67" name="CuadroTexto 66"/>
-          <p:cNvSpPr txBox="1"/>
-          <p:nvPr/>
-        </p:nvSpPr>
-        <p:spPr>
-          <a:xfrm>
-            <a:off x="3205626" y="5185005"/>
-            <a:ext cx="832279" cy="369332"/>
-          </a:xfrm>
-          <a:prstGeom prst="rect">
-            <a:avLst/>
-          </a:prstGeom>
-          <a:noFill/>
-        </p:spPr>
-        <p:txBody>
-          <a:bodyPr wrap="none" rtlCol="0">
-            <a:spAutoFit/>
-          </a:bodyPr>
-          <a:lstStyle/>
-          <a:p>
-            <a:r>
-              <a:rPr lang="es-ES" dirty="0" smtClean="0"/>
-              <a:t>Golpes</a:t>
-            </a:r>
-            <a:endParaRPr lang="es-ES" dirty="0"/>
-          </a:p>
-        </p:txBody>
-      </p:sp>
-      <p:sp>
-        <p:nvSpPr>
-          <p:cNvPr id="68" name="CuadroTexto 67"/>
-          <p:cNvSpPr txBox="1"/>
-          <p:nvPr/>
-        </p:nvSpPr>
-        <p:spPr>
-          <a:xfrm>
-            <a:off x="4094773" y="5180983"/>
-            <a:ext cx="1066318" cy="369332"/>
-          </a:xfrm>
-          <a:prstGeom prst="rect">
-            <a:avLst/>
-          </a:prstGeom>
-          <a:noFill/>
-        </p:spPr>
-        <p:txBody>
-          <a:bodyPr wrap="none" rtlCol="0">
-            <a:spAutoFit/>
-          </a:bodyPr>
-          <a:lstStyle/>
-          <a:p>
-            <a:r>
-              <a:rPr lang="es-ES" dirty="0" smtClean="0"/>
-              <a:t>Unidades</a:t>
-            </a:r>
-            <a:endParaRPr lang="es-ES" dirty="0"/>
+              <a:rPr lang="es-ES" sz="1700" dirty="0" smtClean="0"/>
+              <a:t>/9</a:t>
+            </a:r>
           </a:p>
         </p:txBody>
       </p:sp>
@@ -5777,94 +3959,14 @@
       </p:sp>
       <p:sp>
         <p:nvSpPr>
-          <p:cNvPr id="4" name="Elipse 3"/>
-          <p:cNvSpPr/>
-          <p:nvPr/>
-        </p:nvSpPr>
-        <p:spPr>
-          <a:xfrm>
-            <a:off x="6640284" y="1436915"/>
-            <a:ext cx="914400" cy="914400"/>
-          </a:xfrm>
-          <a:prstGeom prst="ellipse">
-            <a:avLst/>
-          </a:prstGeom>
-        </p:spPr>
-        <p:style>
-          <a:lnRef idx="2">
-            <a:schemeClr val="accent1">
-              <a:shade val="50000"/>
-            </a:schemeClr>
-          </a:lnRef>
-          <a:fillRef idx="1">
-            <a:schemeClr val="accent1"/>
-          </a:fillRef>
-          <a:effectRef idx="0">
-            <a:schemeClr val="accent1"/>
-          </a:effectRef>
-          <a:fontRef idx="minor">
-            <a:schemeClr val="lt1"/>
-          </a:fontRef>
-        </p:style>
-        <p:txBody>
-          <a:bodyPr rtlCol="0" anchor="ctr"/>
-          <a:lstStyle/>
-          <a:p>
-            <a:pPr algn="ctr"/>
-            <a:endParaRPr lang="en-US"/>
-          </a:p>
-        </p:txBody>
-      </p:sp>
-      <p:sp>
-        <p:nvSpPr>
-          <p:cNvPr id="5" name="Elipse 4"/>
-          <p:cNvSpPr/>
-          <p:nvPr/>
-        </p:nvSpPr>
-        <p:spPr>
-          <a:xfrm>
-            <a:off x="4175759" y="1436915"/>
-            <a:ext cx="914400" cy="914400"/>
-          </a:xfrm>
-          <a:prstGeom prst="ellipse">
-            <a:avLst/>
-          </a:prstGeom>
-        </p:spPr>
-        <p:style>
-          <a:lnRef idx="2">
-            <a:schemeClr val="accent1">
-              <a:shade val="50000"/>
-            </a:schemeClr>
-          </a:lnRef>
-          <a:fillRef idx="1">
-            <a:schemeClr val="accent1"/>
-          </a:fillRef>
-          <a:effectRef idx="0">
-            <a:schemeClr val="accent1"/>
-          </a:effectRef>
-          <a:fontRef idx="minor">
-            <a:schemeClr val="lt1"/>
-          </a:fontRef>
-        </p:style>
-        <p:txBody>
-          <a:bodyPr rtlCol="0" anchor="ctr"/>
-          <a:lstStyle/>
-          <a:p>
-            <a:pPr algn="ctr"/>
-            <a:endParaRPr lang="en-US"/>
-          </a:p>
-        </p:txBody>
-      </p:sp>
-      <p:sp>
-        <p:nvSpPr>
-          <p:cNvPr id="8" name="CuadroTexto 7"/>
+          <p:cNvPr id="9" name="CuadroTexto 8"/>
           <p:cNvSpPr txBox="1"/>
           <p:nvPr/>
         </p:nvSpPr>
         <p:spPr>
           <a:xfrm>
-            <a:off x="4894217" y="251153"/>
-            <a:ext cx="1204369" cy="369332"/>
+            <a:off x="1768292" y="2751909"/>
+            <a:ext cx="800284" cy="369332"/>
           </a:xfrm>
           <a:prstGeom prst="rect">
             <a:avLst/>
@@ -5878,98 +3980,10 @@
           <a:lstStyle/>
           <a:p>
             <a:r>
-              <a:rPr lang="es-AR" dirty="0" smtClean="0"/>
-              <a:t>Pulsadores</a:t>
-            </a:r>
-          </a:p>
-        </p:txBody>
-      </p:sp>
-      <p:sp>
-        <p:nvSpPr>
-          <p:cNvPr id="9" name="CuadroTexto 8"/>
-          <p:cNvSpPr txBox="1"/>
-          <p:nvPr/>
-        </p:nvSpPr>
-        <p:spPr>
-          <a:xfrm>
-            <a:off x="1768292" y="2751909"/>
-            <a:ext cx="800284" cy="369332"/>
-          </a:xfrm>
-          <a:prstGeom prst="rect">
-            <a:avLst/>
-          </a:prstGeom>
-          <a:noFill/>
-        </p:spPr>
-        <p:txBody>
-          <a:bodyPr wrap="none" rtlCol="0">
-            <a:spAutoFit/>
-          </a:bodyPr>
-          <a:lstStyle/>
-          <a:p>
-            <a:r>
               <a:rPr lang="es-AR" dirty="0" err="1" smtClean="0"/>
               <a:t>Switch</a:t>
             </a:r>
             <a:endParaRPr lang="es-AR" dirty="0" smtClean="0"/>
-          </a:p>
-        </p:txBody>
-      </p:sp>
-      <p:sp>
-        <p:nvSpPr>
-          <p:cNvPr id="10" name="CuadroTexto 9"/>
-          <p:cNvSpPr txBox="1"/>
-          <p:nvPr/>
-        </p:nvSpPr>
-        <p:spPr>
-          <a:xfrm>
-            <a:off x="4153020" y="2751909"/>
-            <a:ext cx="959878" cy="369332"/>
-          </a:xfrm>
-          <a:prstGeom prst="rect">
-            <a:avLst/>
-          </a:prstGeom>
-          <a:noFill/>
-        </p:spPr>
-        <p:txBody>
-          <a:bodyPr wrap="none" rtlCol="0">
-            <a:spAutoFit/>
-          </a:bodyPr>
-          <a:lstStyle/>
-          <a:p>
-            <a:r>
-              <a:rPr lang="es-AR" dirty="0" smtClean="0"/>
-              <a:t>Finalizar</a:t>
-            </a:r>
-            <a:endParaRPr lang="en-US" dirty="0"/>
-          </a:p>
-        </p:txBody>
-      </p:sp>
-      <p:sp>
-        <p:nvSpPr>
-          <p:cNvPr id="11" name="CuadroTexto 10"/>
-          <p:cNvSpPr txBox="1"/>
-          <p:nvPr/>
-        </p:nvSpPr>
-        <p:spPr>
-          <a:xfrm>
-            <a:off x="6213684" y="2751909"/>
-            <a:ext cx="1767600" cy="369332"/>
-          </a:xfrm>
-          <a:prstGeom prst="rect">
-            <a:avLst/>
-          </a:prstGeom>
-          <a:noFill/>
-        </p:spPr>
-        <p:txBody>
-          <a:bodyPr wrap="none" rtlCol="0">
-            <a:spAutoFit/>
-          </a:bodyPr>
-          <a:lstStyle/>
-          <a:p>
-            <a:r>
-              <a:rPr lang="es-AR" dirty="0" smtClean="0"/>
-              <a:t>Agregar operario</a:t>
-            </a:r>
           </a:p>
         </p:txBody>
       </p:sp>
@@ -6266,7 +4280,33 @@
       </a:bgFillStyleLst>
     </a:fmtScheme>
   </a:themeElements>
-  <a:objectDefaults/>
+  <a:objectDefaults>
+    <a:spDef>
+      <a:spPr/>
+      <a:bodyPr rtlCol="0" anchor="ctr"/>
+      <a:lstStyle>
+        <a:defPPr algn="ctr">
+          <a:defRPr dirty="0" smtClean="0"/>
+        </a:defPPr>
+      </a:lstStyle>
+      <a:style>
+        <a:lnRef idx="2">
+          <a:schemeClr val="accent1">
+            <a:shade val="50000"/>
+          </a:schemeClr>
+        </a:lnRef>
+        <a:fillRef idx="1">
+          <a:schemeClr val="accent1"/>
+        </a:fillRef>
+        <a:effectRef idx="0">
+          <a:schemeClr val="accent1"/>
+        </a:effectRef>
+        <a:fontRef idx="minor">
+          <a:schemeClr val="lt1"/>
+        </a:fontRef>
+      </a:style>
+    </a:spDef>
+  </a:objectDefaults>
   <a:extraClrSchemeLst/>
   <a:extLst>
     <a:ext uri="{05A4C25C-085E-4340-85A3-A5531E510DB2}">

</xml_diff>